<commit_message>
Update ppt, fix errors in documentation and add heuristic's explanation in readme
</commit_message>
<xml_diff>
--- a/Chess Snake Puzzles – 2022 IA Project - Final Delivery.pptx
+++ b/Chess Snake Puzzles – 2022 IA Project - Final Delivery.pptx
@@ -131,10 +131,154 @@
 </p:presentation>
 </file>
 
+<file path=ppt/revisionInfo.xml><?xml version="1.0" encoding="utf-8"?>
+<p1510:revInfo xmlns:a="http://schemas.openxmlformats.org/drawingml/2006/main" xmlns:r="http://schemas.openxmlformats.org/officeDocument/2006/relationships" xmlns:p1510="http://schemas.microsoft.com/office/powerpoint/2015/10/main">
+  <p1510:revLst>
+    <p1510:client id="{1FAC947E-5D31-4632-AFA2-6C66DC948B4A}" v="26" dt="2022-04-25T15:38:05.132"/>
+  </p1510:revLst>
+</p1510:revInfo>
+</file>
+
+<file path=ppt/changesInfos/changesInfo1.xml><?xml version="1.0" encoding="utf-8"?>
+<pc:chgInfo xmlns:a="http://schemas.openxmlformats.org/drawingml/2006/main" xmlns:r="http://schemas.openxmlformats.org/officeDocument/2006/relationships" xmlns:ac="http://schemas.microsoft.com/office/drawing/2013/main/command" xmlns:pc="http://schemas.microsoft.com/office/powerpoint/2013/main/command">
+  <pc:docChgLst>
+    <pc:chgData name="Carlos Gomes" userId="befe0c0c48f41b83" providerId="LiveId" clId="{1FAC947E-5D31-4632-AFA2-6C66DC948B4A}"/>
+    <pc:docChg chg="undo custSel modSld">
+      <pc:chgData name="Carlos Gomes" userId="befe0c0c48f41b83" providerId="LiveId" clId="{1FAC947E-5D31-4632-AFA2-6C66DC948B4A}" dt="2022-04-25T15:52:01.587" v="1366" actId="20577"/>
+      <pc:docMkLst>
+        <pc:docMk/>
+      </pc:docMkLst>
+      <pc:sldChg chg="modSp mod">
+        <pc:chgData name="Carlos Gomes" userId="befe0c0c48f41b83" providerId="LiveId" clId="{1FAC947E-5D31-4632-AFA2-6C66DC948B4A}" dt="2022-04-25T15:16:39.211" v="23" actId="20577"/>
+        <pc:sldMkLst>
+          <pc:docMk/>
+          <pc:sldMk cId="0" sldId="256"/>
+        </pc:sldMkLst>
+        <pc:spChg chg="mod">
+          <ac:chgData name="Carlos Gomes" userId="befe0c0c48f41b83" providerId="LiveId" clId="{1FAC947E-5D31-4632-AFA2-6C66DC948B4A}" dt="2022-04-25T15:16:39.211" v="23" actId="20577"/>
+          <ac:spMkLst>
+            <pc:docMk/>
+            <pc:sldMk cId="0" sldId="256"/>
+            <ac:spMk id="2" creationId="{00000000-0000-0000-0000-000000000000}"/>
+          </ac:spMkLst>
+        </pc:spChg>
+      </pc:sldChg>
+      <pc:sldChg chg="addSp delSp modSp mod">
+        <pc:chgData name="Carlos Gomes" userId="befe0c0c48f41b83" providerId="LiveId" clId="{1FAC947E-5D31-4632-AFA2-6C66DC948B4A}" dt="2022-04-25T15:25:17.465" v="448" actId="1076"/>
+        <pc:sldMkLst>
+          <pc:docMk/>
+          <pc:sldMk cId="0" sldId="259"/>
+        </pc:sldMkLst>
+        <pc:spChg chg="mod">
+          <ac:chgData name="Carlos Gomes" userId="befe0c0c48f41b83" providerId="LiveId" clId="{1FAC947E-5D31-4632-AFA2-6C66DC948B4A}" dt="2022-04-25T15:25:17.465" v="448" actId="1076"/>
+          <ac:spMkLst>
+            <pc:docMk/>
+            <pc:sldMk cId="0" sldId="259"/>
+            <ac:spMk id="3" creationId="{00000000-0000-0000-0000-000000000000}"/>
+          </ac:spMkLst>
+        </pc:spChg>
+        <pc:spChg chg="add del">
+          <ac:chgData name="Carlos Gomes" userId="befe0c0c48f41b83" providerId="LiveId" clId="{1FAC947E-5D31-4632-AFA2-6C66DC948B4A}" dt="2022-04-25T15:18:40.513" v="65"/>
+          <ac:spMkLst>
+            <pc:docMk/>
+            <pc:sldMk cId="0" sldId="259"/>
+            <ac:spMk id="4" creationId="{1608BB0B-849C-4952-97B5-F8E3168693A9}"/>
+          </ac:spMkLst>
+        </pc:spChg>
+      </pc:sldChg>
+      <pc:sldChg chg="modSp mod">
+        <pc:chgData name="Carlos Gomes" userId="befe0c0c48f41b83" providerId="LiveId" clId="{1FAC947E-5D31-4632-AFA2-6C66DC948B4A}" dt="2022-04-25T15:30:22.292" v="549" actId="404"/>
+        <pc:sldMkLst>
+          <pc:docMk/>
+          <pc:sldMk cId="0" sldId="260"/>
+        </pc:sldMkLst>
+        <pc:graphicFrameChg chg="mod modGraphic">
+          <ac:chgData name="Carlos Gomes" userId="befe0c0c48f41b83" providerId="LiveId" clId="{1FAC947E-5D31-4632-AFA2-6C66DC948B4A}" dt="2022-04-25T15:30:22.292" v="549" actId="404"/>
+          <ac:graphicFrameMkLst>
+            <pc:docMk/>
+            <pc:sldMk cId="0" sldId="260"/>
+            <ac:graphicFrameMk id="4" creationId="{00000000-0000-0000-0000-000000000000}"/>
+          </ac:graphicFrameMkLst>
+        </pc:graphicFrameChg>
+      </pc:sldChg>
+      <pc:sldChg chg="addSp delSp modSp mod">
+        <pc:chgData name="Carlos Gomes" userId="befe0c0c48f41b83" providerId="LiveId" clId="{1FAC947E-5D31-4632-AFA2-6C66DC948B4A}" dt="2022-04-25T15:38:46.671" v="690" actId="113"/>
+        <pc:sldMkLst>
+          <pc:docMk/>
+          <pc:sldMk cId="0" sldId="261"/>
+        </pc:sldMkLst>
+        <pc:spChg chg="mod">
+          <ac:chgData name="Carlos Gomes" userId="befe0c0c48f41b83" providerId="LiveId" clId="{1FAC947E-5D31-4632-AFA2-6C66DC948B4A}" dt="2022-04-25T15:38:46.671" v="690" actId="113"/>
+          <ac:spMkLst>
+            <pc:docMk/>
+            <pc:sldMk cId="0" sldId="261"/>
+            <ac:spMk id="3" creationId="{00000000-0000-0000-0000-000000000000}"/>
+          </ac:spMkLst>
+        </pc:spChg>
+        <pc:spChg chg="add del">
+          <ac:chgData name="Carlos Gomes" userId="befe0c0c48f41b83" providerId="LiveId" clId="{1FAC947E-5D31-4632-AFA2-6C66DC948B4A}" dt="2022-04-25T15:33:38.404" v="563"/>
+          <ac:spMkLst>
+            <pc:docMk/>
+            <pc:sldMk cId="0" sldId="261"/>
+            <ac:spMk id="4" creationId="{FB2DF42D-0F61-4E10-8D21-4D809578D54F}"/>
+          </ac:spMkLst>
+        </pc:spChg>
+        <pc:spChg chg="add del">
+          <ac:chgData name="Carlos Gomes" userId="befe0c0c48f41b83" providerId="LiveId" clId="{1FAC947E-5D31-4632-AFA2-6C66DC948B4A}" dt="2022-04-25T15:38:05.132" v="664"/>
+          <ac:spMkLst>
+            <pc:docMk/>
+            <pc:sldMk cId="0" sldId="261"/>
+            <ac:spMk id="5" creationId="{99488B37-ADCE-47D1-AED1-10BDE623A89F}"/>
+          </ac:spMkLst>
+        </pc:spChg>
+      </pc:sldChg>
+      <pc:sldChg chg="modSp mod">
+        <pc:chgData name="Carlos Gomes" userId="befe0c0c48f41b83" providerId="LiveId" clId="{1FAC947E-5D31-4632-AFA2-6C66DC948B4A}" dt="2022-04-25T15:52:01.587" v="1366" actId="20577"/>
+        <pc:sldMkLst>
+          <pc:docMk/>
+          <pc:sldMk cId="2821232108" sldId="262"/>
+        </pc:sldMkLst>
+        <pc:spChg chg="mod">
+          <ac:chgData name="Carlos Gomes" userId="befe0c0c48f41b83" providerId="LiveId" clId="{1FAC947E-5D31-4632-AFA2-6C66DC948B4A}" dt="2022-04-25T15:52:01.587" v="1366" actId="20577"/>
+          <ac:spMkLst>
+            <pc:docMk/>
+            <pc:sldMk cId="2821232108" sldId="262"/>
+            <ac:spMk id="3" creationId="{2D332176-E858-8927-48C6-57123435F282}"/>
+          </ac:spMkLst>
+        </pc:spChg>
+      </pc:sldChg>
+      <pc:sldChg chg="modSp mod">
+        <pc:chgData name="Carlos Gomes" userId="befe0c0c48f41b83" providerId="LiveId" clId="{1FAC947E-5D31-4632-AFA2-6C66DC948B4A}" dt="2022-04-25T15:13:07.944" v="22" actId="692"/>
+        <pc:sldMkLst>
+          <pc:docMk/>
+          <pc:sldMk cId="1535208297" sldId="264"/>
+        </pc:sldMkLst>
+        <pc:graphicFrameChg chg="mod">
+          <ac:chgData name="Carlos Gomes" userId="befe0c0c48f41b83" providerId="LiveId" clId="{1FAC947E-5D31-4632-AFA2-6C66DC948B4A}" dt="2022-04-25T15:08:38.693" v="7" actId="692"/>
+          <ac:graphicFrameMkLst>
+            <pc:docMk/>
+            <pc:sldMk cId="1535208297" sldId="264"/>
+            <ac:graphicFrameMk id="7" creationId="{E71EE01E-51C0-4538-8A33-100DC49D0A10}"/>
+          </ac:graphicFrameMkLst>
+        </pc:graphicFrameChg>
+        <pc:graphicFrameChg chg="mod">
+          <ac:chgData name="Carlos Gomes" userId="befe0c0c48f41b83" providerId="LiveId" clId="{1FAC947E-5D31-4632-AFA2-6C66DC948B4A}" dt="2022-04-25T15:13:07.944" v="22" actId="692"/>
+          <ac:graphicFrameMkLst>
+            <pc:docMk/>
+            <pc:sldMk cId="1535208297" sldId="264"/>
+            <ac:graphicFrameMk id="8" creationId="{5998C934-CF5B-4085-9EB6-7295C56FFCA1}"/>
+          </ac:graphicFrameMkLst>
+        </pc:graphicFrameChg>
+      </pc:sldChg>
+    </pc:docChg>
+  </pc:docChgLst>
+</pc:chgInfo>
+</file>
+
 <file path=ppt/charts/chart1.xml><?xml version="1.0" encoding="utf-8"?>
 <c:chartSpace xmlns:c="http://schemas.openxmlformats.org/drawingml/2006/chart" xmlns:a="http://schemas.openxmlformats.org/drawingml/2006/main" xmlns:r="http://schemas.openxmlformats.org/officeDocument/2006/relationships" xmlns:c16r2="http://schemas.microsoft.com/office/drawing/2015/06/chart">
   <c:date1904 val="0"/>
-  <c:lang val="pt-PT"/>
+  <c:lang val="en-US"/>
   <c:roundedCorners val="0"/>
   <mc:AlternateContent xmlns:mc="http://schemas.openxmlformats.org/markup-compatibility/2006">
     <mc:Choice xmlns:c14="http://schemas.microsoft.com/office/drawing/2007/8/2/chart" Requires="c14">
@@ -168,7 +312,7 @@
           <c:spPr>
             <a:ln w="28575" cap="rnd">
               <a:solidFill>
-                <a:schemeClr val="accent1"/>
+                <a:srgbClr val="FF0000"/>
               </a:solidFill>
               <a:round/>
             </a:ln>
@@ -254,7 +398,7 @@
           <c:spPr>
             <a:ln w="28575" cap="rnd">
               <a:solidFill>
-                <a:schemeClr val="accent2"/>
+                <a:srgbClr val="92D050"/>
               </a:solidFill>
               <a:round/>
             </a:ln>
@@ -340,7 +484,7 @@
           <c:spPr>
             <a:ln w="28575" cap="rnd">
               <a:solidFill>
-                <a:schemeClr val="accent3"/>
+                <a:srgbClr val="090ED5"/>
               </a:solidFill>
               <a:round/>
             </a:ln>
@@ -426,7 +570,7 @@
           <c:spPr>
             <a:ln w="28575" cap="rnd">
               <a:solidFill>
-                <a:schemeClr val="accent4"/>
+                <a:srgbClr val="00B0F0"/>
               </a:solidFill>
               <a:round/>
             </a:ln>
@@ -512,7 +656,7 @@
           <c:spPr>
             <a:ln w="28575" cap="rnd">
               <a:solidFill>
-                <a:schemeClr val="accent5"/>
+                <a:srgbClr val="7030A0"/>
               </a:solidFill>
               <a:round/>
             </a:ln>
@@ -590,7 +734,7 @@
               <c:strCache>
                 <c:ptCount val="1"/>
                 <c:pt idx="0">
-                  <c:v>GREEDY2(1)</c:v>
+                  <c:v>GREEDY(1)</c:v>
                 </c:pt>
               </c:strCache>
             </c:strRef>
@@ -598,7 +742,7 @@
           <c:spPr>
             <a:ln w="28575" cap="rnd">
               <a:solidFill>
-                <a:schemeClr val="accent6"/>
+                <a:srgbClr val="FFC000"/>
               </a:solidFill>
               <a:round/>
             </a:ln>
@@ -684,9 +828,7 @@
           <c:spPr>
             <a:ln w="28575" cap="rnd">
               <a:solidFill>
-                <a:schemeClr val="accent1">
-                  <a:lumMod val="60000"/>
-                </a:schemeClr>
+                <a:srgbClr val="866B4A"/>
               </a:solidFill>
               <a:round/>
             </a:ln>
@@ -946,7 +1088,7 @@
 <file path=ppt/charts/chart2.xml><?xml version="1.0" encoding="utf-8"?>
 <c:chartSpace xmlns:c="http://schemas.openxmlformats.org/drawingml/2006/chart" xmlns:a="http://schemas.openxmlformats.org/drawingml/2006/main" xmlns:r="http://schemas.openxmlformats.org/officeDocument/2006/relationships" xmlns:c16r2="http://schemas.microsoft.com/office/drawing/2015/06/chart">
   <c:date1904 val="0"/>
-  <c:lang val="pt-PT"/>
+  <c:lang val="en-US"/>
   <c:roundedCorners val="0"/>
   <mc:AlternateContent xmlns:mc="http://schemas.openxmlformats.org/markup-compatibility/2006">
     <mc:Choice xmlns:c14="http://schemas.microsoft.com/office/drawing/2007/8/2/chart" Requires="c14">
@@ -980,7 +1122,7 @@
           <c:spPr>
             <a:ln w="28575" cap="rnd">
               <a:solidFill>
-                <a:schemeClr val="accent2"/>
+                <a:srgbClr val="FF0000"/>
               </a:solidFill>
               <a:round/>
             </a:ln>
@@ -1066,7 +1208,7 @@
           <c:spPr>
             <a:ln w="28575" cap="rnd">
               <a:solidFill>
-                <a:schemeClr val="accent4"/>
+                <a:srgbClr val="92D050"/>
               </a:solidFill>
               <a:round/>
             </a:ln>
@@ -1152,7 +1294,7 @@
           <c:spPr>
             <a:ln w="28575" cap="rnd">
               <a:solidFill>
-                <a:schemeClr val="accent6"/>
+                <a:srgbClr val="090ED5"/>
               </a:solidFill>
               <a:round/>
             </a:ln>
@@ -1238,9 +1380,7 @@
           <c:spPr>
             <a:ln w="28575" cap="rnd">
               <a:solidFill>
-                <a:schemeClr val="accent2">
-                  <a:lumMod val="60000"/>
-                </a:schemeClr>
+                <a:srgbClr val="00B0F0"/>
               </a:solidFill>
               <a:round/>
             </a:ln>
@@ -1326,9 +1466,7 @@
           <c:spPr>
             <a:ln w="28575" cap="rnd">
               <a:solidFill>
-                <a:schemeClr val="accent4">
-                  <a:lumMod val="60000"/>
-                </a:schemeClr>
+                <a:srgbClr val="7030A0"/>
               </a:solidFill>
               <a:round/>
             </a:ln>
@@ -1406,7 +1544,7 @@
               <c:strCache>
                 <c:ptCount val="1"/>
                 <c:pt idx="0">
-                  <c:v>GREEDY2(1)</c:v>
+                  <c:v>GREEDY(1)</c:v>
                 </c:pt>
               </c:strCache>
             </c:strRef>
@@ -1414,9 +1552,7 @@
           <c:spPr>
             <a:ln w="28575" cap="rnd">
               <a:solidFill>
-                <a:schemeClr val="accent6">
-                  <a:lumMod val="60000"/>
-                </a:schemeClr>
+                <a:srgbClr val="FFC000"/>
               </a:solidFill>
               <a:round/>
             </a:ln>
@@ -1502,10 +1638,7 @@
           <c:spPr>
             <a:ln w="28575" cap="rnd">
               <a:solidFill>
-                <a:schemeClr val="accent2">
-                  <a:lumMod val="80000"/>
-                  <a:lumOff val="20000"/>
-                </a:schemeClr>
+                <a:srgbClr val="866B4A"/>
               </a:solidFill>
               <a:round/>
             </a:ln>
@@ -3059,7 +3192,7 @@
             </a:pPr>
             <a:fld id="{07CE569E-9B7C-4CB9-AB80-C0841F922CFF}" type="slidenum">
               <a:rPr lang="en-US"/>
-              <a:t>‹nº›</a:t>
+              <a:t>‹#›</a:t>
             </a:fld>
             <a:endParaRPr lang="en-US"/>
           </a:p>
@@ -3250,7 +3383,7 @@
             </a:pPr>
             <a:fld id="{07CE569E-9B7C-4CB9-AB80-C0841F922CFF}" type="slidenum">
               <a:rPr lang="en-US"/>
-              <a:t>‹nº›</a:t>
+              <a:t>‹#›</a:t>
             </a:fld>
             <a:endParaRPr lang="en-US"/>
           </a:p>
@@ -3451,7 +3584,7 @@
             </a:pPr>
             <a:fld id="{07CE569E-9B7C-4CB9-AB80-C0841F922CFF}" type="slidenum">
               <a:rPr lang="en-US"/>
-              <a:t>‹nº›</a:t>
+              <a:t>‹#›</a:t>
             </a:fld>
             <a:endParaRPr lang="en-US"/>
           </a:p>
@@ -3641,7 +3774,7 @@
             </a:pPr>
             <a:fld id="{07CE569E-9B7C-4CB9-AB80-C0841F922CFF}" type="slidenum">
               <a:rPr lang="en-US"/>
-              <a:t>‹nº›</a:t>
+              <a:t>‹#›</a:t>
             </a:fld>
             <a:endParaRPr lang="en-US"/>
           </a:p>
@@ -3897,7 +4030,7 @@
             </a:pPr>
             <a:fld id="{07CE569E-9B7C-4CB9-AB80-C0841F922CFF}" type="slidenum">
               <a:rPr lang="en-US"/>
-              <a:t>‹nº›</a:t>
+              <a:t>‹#›</a:t>
             </a:fld>
             <a:endParaRPr lang="en-US"/>
           </a:p>
@@ -4164,7 +4297,7 @@
             </a:pPr>
             <a:fld id="{07CE569E-9B7C-4CB9-AB80-C0841F922CFF}" type="slidenum">
               <a:rPr lang="en-US"/>
-              <a:t>‹nº›</a:t>
+              <a:t>‹#›</a:t>
             </a:fld>
             <a:endParaRPr lang="en-US"/>
           </a:p>
@@ -4572,7 +4705,7 @@
             </a:pPr>
             <a:fld id="{07CE569E-9B7C-4CB9-AB80-C0841F922CFF}" type="slidenum">
               <a:rPr lang="en-US"/>
-              <a:t>‹nº›</a:t>
+              <a:t>‹#›</a:t>
             </a:fld>
             <a:endParaRPr lang="en-US"/>
           </a:p>
@@ -4697,7 +4830,7 @@
             </a:pPr>
             <a:fld id="{07CE569E-9B7C-4CB9-AB80-C0841F922CFF}" type="slidenum">
               <a:rPr lang="en-US"/>
-              <a:t>‹nº›</a:t>
+              <a:t>‹#›</a:t>
             </a:fld>
             <a:endParaRPr lang="en-US"/>
           </a:p>
@@ -4796,7 +4929,7 @@
             </a:pPr>
             <a:fld id="{07CE569E-9B7C-4CB9-AB80-C0841F922CFF}" type="slidenum">
               <a:rPr lang="en-US"/>
-              <a:t>‹nº›</a:t>
+              <a:t>‹#›</a:t>
             </a:fld>
             <a:endParaRPr lang="en-US"/>
           </a:p>
@@ -5096,7 +5229,7 @@
             </a:pPr>
             <a:fld id="{07CE569E-9B7C-4CB9-AB80-C0841F922CFF}" type="slidenum">
               <a:rPr lang="en-US"/>
-              <a:t>‹nº›</a:t>
+              <a:t>‹#›</a:t>
             </a:fld>
             <a:endParaRPr lang="en-US"/>
           </a:p>
@@ -5366,7 +5499,7 @@
             </a:pPr>
             <a:fld id="{07CE569E-9B7C-4CB9-AB80-C0841F922CFF}" type="slidenum">
               <a:rPr lang="en-US"/>
-              <a:t>‹nº›</a:t>
+              <a:t>‹#›</a:t>
             </a:fld>
             <a:endParaRPr lang="en-US"/>
           </a:p>
@@ -6124,7 +6257,7 @@
             </a:pPr>
             <a:fld id="{07CE569E-9B7C-4CB9-AB80-C0841F922CFF}" type="slidenum">
               <a:rPr lang="en-US"/>
-              <a:t>‹nº›</a:t>
+              <a:t>‹#›</a:t>
             </a:fld>
             <a:endParaRPr lang="en-US"/>
           </a:p>
@@ -6540,31 +6673,15 @@
               <a:defRPr/>
             </a:pPr>
             <a:r>
-              <a:rPr lang="pt-PT" sz="4400" u="sng" dirty="0" err="1"/>
-              <a:t>Chess</a:t>
-            </a:r>
-            <a:r>
               <a:rPr lang="pt-PT" sz="4400" u="sng" dirty="0"/>
-              <a:t> </a:t>
-            </a:r>
-            <a:r>
-              <a:rPr lang="pt-PT" sz="4400" u="sng" dirty="0" err="1"/>
-              <a:t>Snake</a:t>
-            </a:r>
-            <a:r>
-              <a:rPr lang="pt-PT" sz="4400" u="sng" dirty="0"/>
-              <a:t> </a:t>
+              <a:t>Chess Snake </a:t>
             </a:r>
             <a:br>
               <a:rPr lang="pt-PT" sz="4400" u="sng" dirty="0"/>
             </a:br>
             <a:r>
               <a:rPr lang="pt-PT" sz="4400" u="sng" dirty="0"/>
-              <a:t>IART Project- Final </a:t>
-            </a:r>
-            <a:r>
-              <a:rPr lang="pt-PT" sz="4400" u="sng" dirty="0" err="1"/>
-              <a:t>Delivery</a:t>
+              <a:t>IART Project</a:t>
             </a:r>
             <a:endParaRPr dirty="0"/>
           </a:p>
@@ -7100,30 +7217,30 @@
               <a:defRPr/>
             </a:pPr>
             <a:r>
-              <a:rPr lang="pt-PT"/>
+              <a:rPr lang="pt-PT" dirty="0"/>
               <a:t>The main goal for this project is to, based on Artificial Inteligence skills and search algorithms, implement a version of the puzzle “Chess Snake”;</a:t>
             </a:r>
-            <a:endParaRPr/>
+            <a:endParaRPr dirty="0"/>
           </a:p>
           <a:p>
             <a:pPr>
               <a:defRPr/>
             </a:pPr>
             <a:r>
-              <a:rPr lang="pt-PT"/>
+              <a:rPr lang="pt-PT" dirty="0"/>
               <a:t>The main goal of the puzzle is to connect the bottom left tile of the board with the top right tile, by creating a path according to some rules;</a:t>
             </a:r>
-            <a:endParaRPr/>
+            <a:endParaRPr dirty="0"/>
           </a:p>
           <a:p>
             <a:pPr>
               <a:defRPr/>
             </a:pPr>
             <a:r>
-              <a:rPr lang="pt-PT"/>
+              <a:rPr lang="pt-PT" dirty="0"/>
               <a:t>The rules are: </a:t>
             </a:r>
-            <a:endParaRPr/>
+            <a:endParaRPr dirty="0"/>
           </a:p>
           <a:p>
             <a:pPr marL="0" indent="0">
@@ -7131,10 +7248,10 @@
               <a:defRPr/>
             </a:pPr>
             <a:r>
-              <a:rPr lang="pt-PT"/>
+              <a:rPr lang="pt-PT" dirty="0"/>
               <a:t>    - No loops are allowed;</a:t>
             </a:r>
-            <a:endParaRPr/>
+            <a:endParaRPr dirty="0"/>
           </a:p>
           <a:p>
             <a:pPr marL="0" indent="0">
@@ -7142,10 +7259,10 @@
               <a:defRPr/>
             </a:pPr>
             <a:r>
-              <a:rPr lang="pt-PT"/>
+              <a:rPr lang="pt-PT" dirty="0"/>
               <a:t>    - Each chess piece attacks an equal number of squares of the choose path;</a:t>
             </a:r>
-            <a:endParaRPr/>
+            <a:endParaRPr dirty="0"/>
           </a:p>
           <a:p>
             <a:pPr marL="0" indent="0">
@@ -7153,10 +7270,10 @@
               <a:defRPr/>
             </a:pPr>
             <a:r>
-              <a:rPr lang="pt-PT"/>
+              <a:rPr lang="pt-PT" dirty="0"/>
               <a:t>    - Pieces may not be crossed by the path;</a:t>
             </a:r>
-            <a:endParaRPr/>
+            <a:endParaRPr dirty="0"/>
           </a:p>
           <a:p>
             <a:pPr marL="0" indent="0">
@@ -7164,10 +7281,10 @@
               <a:defRPr/>
             </a:pPr>
             <a:r>
-              <a:rPr lang="pt-PT"/>
+              <a:rPr lang="pt-PT" dirty="0"/>
               <a:t>    - The snake cannot touch itself.</a:t>
             </a:r>
-            <a:endParaRPr/>
+            <a:endParaRPr dirty="0"/>
           </a:p>
         </p:txBody>
       </p:sp>
@@ -7248,10 +7365,15 @@
             <p:ph idx="1"/>
           </p:nvPr>
         </p:nvSpPr>
-        <p:spPr bwMode="auto"/>
+        <p:spPr bwMode="auto">
+          <a:xfrm>
+            <a:off x="762000" y="2132856"/>
+            <a:ext cx="10668000" cy="4311351"/>
+          </a:xfrm>
+        </p:spPr>
         <p:txBody>
           <a:bodyPr vertOverflow="overflow" horzOverflow="clip" vert="horz" wrap="square" lIns="91440" tIns="45720" rIns="91440" bIns="45720" numCol="1" spcCol="0" rtlCol="0" fromWordArt="0" anchor="t" anchorCtr="0" forceAA="0" compatLnSpc="0">
-            <a:normAutofit fontScale="55000" lnSpcReduction="20000"/>
+            <a:noAutofit/>
           </a:bodyPr>
           <a:lstStyle/>
           <a:p>
@@ -7259,1414 +7381,469 @@
               <a:defRPr/>
             </a:pPr>
             <a:r>
-              <a:rPr lang="pt-PT" dirty="0" err="1"/>
+              <a:rPr lang="pt-PT" sz="1400" dirty="0" err="1"/>
               <a:t>State</a:t>
             </a:r>
             <a:r>
-              <a:rPr lang="pt-PT" dirty="0"/>
+              <a:rPr lang="pt-PT" sz="1400" dirty="0"/>
               <a:t> </a:t>
             </a:r>
             <a:r>
-              <a:rPr lang="pt-PT" dirty="0" err="1"/>
+              <a:rPr lang="pt-PT" sz="1400" dirty="0" err="1"/>
               <a:t>Representation</a:t>
             </a:r>
             <a:r>
-              <a:rPr lang="pt-PT" dirty="0"/>
+              <a:rPr lang="pt-PT" sz="1400" dirty="0"/>
               <a:t>: </a:t>
             </a:r>
             <a:r>
-              <a:rPr lang="pt-PT" dirty="0" err="1"/>
+              <a:rPr lang="pt-PT" sz="1400" dirty="0" err="1"/>
               <a:t>The</a:t>
             </a:r>
             <a:r>
-              <a:rPr lang="pt-PT" dirty="0"/>
+              <a:rPr lang="pt-PT" sz="1400" dirty="0"/>
               <a:t> </a:t>
             </a:r>
             <a:r>
-              <a:rPr lang="pt-PT" dirty="0" err="1"/>
+              <a:rPr lang="pt-PT" sz="1400" dirty="0" err="1"/>
               <a:t>board</a:t>
             </a:r>
             <a:r>
-              <a:rPr lang="pt-PT" dirty="0"/>
+              <a:rPr lang="pt-PT" sz="1400" dirty="0"/>
               <a:t> </a:t>
             </a:r>
             <a:r>
-              <a:rPr lang="pt-PT" dirty="0" err="1"/>
+              <a:rPr lang="pt-PT" sz="1400" dirty="0" err="1"/>
               <a:t>is</a:t>
             </a:r>
             <a:r>
-              <a:rPr lang="pt-PT" dirty="0"/>
+              <a:rPr lang="pt-PT" sz="1400" dirty="0"/>
               <a:t> </a:t>
             </a:r>
             <a:r>
-              <a:rPr lang="pt-PT" dirty="0" err="1"/>
+              <a:rPr lang="pt-PT" sz="1400" dirty="0" err="1"/>
               <a:t>represented</a:t>
             </a:r>
             <a:r>
-              <a:rPr lang="pt-PT" dirty="0"/>
+              <a:rPr lang="pt-PT" sz="1400" dirty="0"/>
               <a:t> </a:t>
             </a:r>
             <a:r>
-              <a:rPr lang="pt-PT" dirty="0" err="1"/>
+              <a:rPr lang="pt-PT" sz="1400" dirty="0" err="1"/>
               <a:t>by</a:t>
             </a:r>
             <a:r>
-              <a:rPr lang="pt-PT" dirty="0"/>
+              <a:rPr lang="pt-PT" sz="1400" dirty="0"/>
               <a:t> a </a:t>
             </a:r>
             <a:r>
-              <a:rPr lang="pt-PT" dirty="0" err="1"/>
+              <a:rPr lang="pt-PT" sz="1400" dirty="0" err="1"/>
               <a:t>matrix</a:t>
             </a:r>
             <a:r>
-              <a:rPr lang="pt-PT" dirty="0"/>
+              <a:rPr lang="pt-PT" sz="1400" dirty="0"/>
               <a:t> (</a:t>
             </a:r>
             <a:r>
-              <a:rPr lang="pt-PT" dirty="0" err="1"/>
+              <a:rPr lang="pt-PT" sz="1400" dirty="0" err="1"/>
               <a:t>list</a:t>
             </a:r>
             <a:r>
-              <a:rPr lang="pt-PT" dirty="0"/>
+              <a:rPr lang="pt-PT" sz="1400" dirty="0"/>
               <a:t> </a:t>
             </a:r>
             <a:r>
-              <a:rPr lang="pt-PT" dirty="0" err="1"/>
+              <a:rPr lang="pt-PT" sz="1400" dirty="0" err="1"/>
               <a:t>of</a:t>
             </a:r>
             <a:r>
-              <a:rPr lang="pt-PT" dirty="0"/>
+              <a:rPr lang="pt-PT" sz="1400" dirty="0"/>
               <a:t> </a:t>
             </a:r>
             <a:r>
-              <a:rPr lang="pt-PT" dirty="0" err="1"/>
+              <a:rPr lang="pt-PT" sz="1400" dirty="0" err="1"/>
               <a:t>lists</a:t>
             </a:r>
             <a:r>
-              <a:rPr lang="pt-PT" dirty="0"/>
+              <a:rPr lang="pt-PT" sz="1400" dirty="0"/>
               <a:t>), </a:t>
             </a:r>
             <a:r>
-              <a:rPr lang="pt-PT" dirty="0" err="1"/>
+              <a:rPr lang="pt-PT" sz="1400" dirty="0" err="1"/>
               <a:t>start</a:t>
             </a:r>
             <a:r>
-              <a:rPr lang="pt-PT" dirty="0"/>
+              <a:rPr lang="pt-PT" sz="1400" dirty="0"/>
               <a:t> </a:t>
             </a:r>
             <a:r>
-              <a:rPr lang="pt-PT" dirty="0" err="1"/>
+              <a:rPr lang="pt-PT" sz="1400" dirty="0" err="1"/>
               <a:t>and</a:t>
             </a:r>
             <a:r>
-              <a:rPr lang="pt-PT" dirty="0"/>
+              <a:rPr lang="pt-PT" sz="1400" dirty="0"/>
               <a:t> </a:t>
             </a:r>
             <a:r>
-              <a:rPr lang="pt-PT" dirty="0" err="1"/>
+              <a:rPr lang="pt-PT" sz="1400" dirty="0" err="1"/>
               <a:t>end</a:t>
             </a:r>
             <a:r>
-              <a:rPr lang="pt-PT" dirty="0"/>
+              <a:rPr lang="pt-PT" sz="1400" dirty="0"/>
               <a:t> tile are </a:t>
             </a:r>
             <a:r>
-              <a:rPr lang="pt-PT" dirty="0" err="1"/>
+              <a:rPr lang="pt-PT" sz="1400" dirty="0" err="1"/>
               <a:t>represented</a:t>
             </a:r>
             <a:r>
-              <a:rPr lang="pt-PT" dirty="0"/>
+              <a:rPr lang="pt-PT" sz="1400" dirty="0"/>
               <a:t> </a:t>
             </a:r>
             <a:r>
-              <a:rPr lang="pt-PT" dirty="0" err="1"/>
+              <a:rPr lang="pt-PT" sz="1400" dirty="0" err="1"/>
               <a:t>by</a:t>
             </a:r>
             <a:r>
-              <a:rPr lang="pt-PT" dirty="0"/>
+              <a:rPr lang="pt-PT" sz="1400" dirty="0"/>
               <a:t> </a:t>
             </a:r>
             <a:r>
-              <a:rPr lang="pt-PT" dirty="0" err="1"/>
+              <a:rPr lang="pt-PT" sz="1400" dirty="0" err="1"/>
               <a:t>the</a:t>
             </a:r>
             <a:r>
-              <a:rPr lang="pt-PT" dirty="0"/>
+              <a:rPr lang="pt-PT" sz="1400" dirty="0"/>
               <a:t> </a:t>
             </a:r>
             <a:r>
-              <a:rPr lang="pt-PT" dirty="0" err="1"/>
+              <a:rPr lang="pt-PT" sz="1400" dirty="0" err="1"/>
               <a:t>char</a:t>
             </a:r>
             <a:r>
-              <a:rPr lang="pt-PT" dirty="0"/>
+              <a:rPr lang="pt-PT" sz="1400" dirty="0"/>
               <a:t> ‘s’ </a:t>
             </a:r>
             <a:r>
-              <a:rPr lang="pt-PT" dirty="0" err="1"/>
+              <a:rPr lang="pt-PT" sz="1400" dirty="0" err="1"/>
               <a:t>and</a:t>
             </a:r>
             <a:r>
-              <a:rPr lang="pt-PT" dirty="0"/>
+              <a:rPr lang="pt-PT" sz="1400" dirty="0"/>
               <a:t> ‘f’, </a:t>
             </a:r>
             <a:r>
-              <a:rPr lang="pt-PT" dirty="0" err="1"/>
+              <a:rPr lang="pt-PT" sz="1400" dirty="0" err="1"/>
               <a:t>respectively</a:t>
             </a:r>
             <a:r>
-              <a:rPr lang="pt-PT" dirty="0"/>
+              <a:rPr lang="pt-PT" sz="1400" dirty="0"/>
               <a:t>, </a:t>
             </a:r>
             <a:r>
-              <a:rPr lang="pt-PT" dirty="0" err="1"/>
+              <a:rPr lang="pt-PT" sz="1400" dirty="0" err="1"/>
               <a:t>each</a:t>
             </a:r>
             <a:r>
-              <a:rPr lang="pt-PT" dirty="0"/>
+              <a:rPr lang="pt-PT" sz="1400" dirty="0"/>
               <a:t> </a:t>
             </a:r>
             <a:r>
-              <a:rPr lang="pt-PT" dirty="0" err="1"/>
+              <a:rPr lang="pt-PT" sz="1400" dirty="0" err="1"/>
               <a:t>chess</a:t>
             </a:r>
             <a:r>
-              <a:rPr lang="pt-PT" dirty="0"/>
+              <a:rPr lang="pt-PT" sz="1400" dirty="0"/>
               <a:t> </a:t>
             </a:r>
             <a:r>
-              <a:rPr lang="pt-PT" dirty="0" err="1"/>
+              <a:rPr lang="pt-PT" sz="1400" dirty="0" err="1"/>
               <a:t>piece</a:t>
             </a:r>
             <a:r>
-              <a:rPr lang="pt-PT" dirty="0"/>
+              <a:rPr lang="pt-PT" sz="1400" dirty="0"/>
               <a:t> </a:t>
             </a:r>
             <a:r>
-              <a:rPr lang="pt-PT" dirty="0" err="1"/>
+              <a:rPr lang="pt-PT" sz="1400" dirty="0" err="1"/>
               <a:t>is</a:t>
             </a:r>
             <a:r>
-              <a:rPr lang="pt-PT" dirty="0"/>
+              <a:rPr lang="pt-PT" sz="1400" dirty="0"/>
               <a:t> </a:t>
             </a:r>
             <a:r>
-              <a:rPr lang="pt-PT" dirty="0" err="1"/>
+              <a:rPr lang="pt-PT" sz="1400" dirty="0" err="1"/>
               <a:t>also</a:t>
             </a:r>
             <a:r>
-              <a:rPr lang="pt-PT" dirty="0"/>
+              <a:rPr lang="pt-PT" sz="1400" dirty="0"/>
               <a:t> </a:t>
             </a:r>
             <a:r>
-              <a:rPr lang="pt-PT" dirty="0" err="1"/>
+              <a:rPr lang="pt-PT" sz="1400" dirty="0" err="1"/>
               <a:t>represented</a:t>
             </a:r>
             <a:r>
-              <a:rPr lang="pt-PT" dirty="0"/>
+              <a:rPr lang="pt-PT" sz="1400" dirty="0"/>
               <a:t> </a:t>
             </a:r>
             <a:r>
-              <a:rPr lang="pt-PT" dirty="0" err="1"/>
+              <a:rPr lang="pt-PT" sz="1400" dirty="0" err="1"/>
               <a:t>by</a:t>
             </a:r>
             <a:r>
-              <a:rPr lang="pt-PT" dirty="0"/>
+              <a:rPr lang="pt-PT" sz="1400" dirty="0"/>
               <a:t> a </a:t>
             </a:r>
             <a:r>
-              <a:rPr lang="pt-PT" dirty="0" err="1"/>
+              <a:rPr lang="pt-PT" sz="1400" dirty="0" err="1"/>
               <a:t>char</a:t>
             </a:r>
             <a:r>
-              <a:rPr lang="pt-PT" dirty="0"/>
+              <a:rPr lang="pt-PT" sz="1400" dirty="0"/>
               <a:t> (king – k, queen – q, </a:t>
             </a:r>
             <a:r>
-              <a:rPr lang="pt-PT" dirty="0" err="1"/>
+              <a:rPr lang="pt-PT" sz="1400" dirty="0" err="1"/>
               <a:t>bishop</a:t>
             </a:r>
             <a:r>
-              <a:rPr lang="pt-PT" dirty="0"/>
+              <a:rPr lang="pt-PT" sz="1400" dirty="0"/>
               <a:t> – b, </a:t>
             </a:r>
             <a:r>
-              <a:rPr lang="pt-PT" dirty="0" err="1"/>
+              <a:rPr lang="pt-PT" sz="1400" dirty="0" err="1"/>
               <a:t>knigth</a:t>
             </a:r>
             <a:r>
-              <a:rPr lang="pt-PT" dirty="0"/>
+              <a:rPr lang="pt-PT" sz="1400" dirty="0"/>
               <a:t> – n, </a:t>
             </a:r>
             <a:r>
-              <a:rPr lang="pt-PT" dirty="0" err="1"/>
+              <a:rPr lang="pt-PT" sz="1400" dirty="0" err="1"/>
               <a:t>rook</a:t>
             </a:r>
             <a:r>
-              <a:rPr lang="pt-PT" dirty="0"/>
+              <a:rPr lang="pt-PT" sz="1400" dirty="0"/>
               <a:t> –r </a:t>
             </a:r>
             <a:r>
-              <a:rPr lang="pt-PT" dirty="0" err="1"/>
+              <a:rPr lang="pt-PT" sz="1400" dirty="0" err="1"/>
               <a:t>and</a:t>
             </a:r>
             <a:r>
-              <a:rPr lang="pt-PT" dirty="0"/>
+              <a:rPr lang="pt-PT" sz="1400" dirty="0"/>
               <a:t> </a:t>
             </a:r>
             <a:r>
-              <a:rPr lang="pt-PT" dirty="0" err="1"/>
+              <a:rPr lang="pt-PT" sz="1400" dirty="0" err="1"/>
               <a:t>pawn</a:t>
             </a:r>
             <a:r>
-              <a:rPr lang="pt-PT" dirty="0"/>
+              <a:rPr lang="pt-PT" sz="1400" dirty="0"/>
               <a:t> - p) </a:t>
             </a:r>
             <a:r>
-              <a:rPr lang="pt-PT" dirty="0" err="1"/>
+              <a:rPr lang="pt-PT" sz="1400" dirty="0" err="1"/>
               <a:t>the</a:t>
             </a:r>
             <a:r>
-              <a:rPr lang="pt-PT" dirty="0"/>
+              <a:rPr lang="pt-PT" sz="1400" dirty="0"/>
               <a:t> </a:t>
             </a:r>
             <a:r>
-              <a:rPr lang="pt-PT" dirty="0" err="1"/>
+              <a:rPr lang="pt-PT" sz="1400" dirty="0" err="1"/>
               <a:t>path</a:t>
             </a:r>
             <a:r>
-              <a:rPr lang="pt-PT" dirty="0"/>
+              <a:rPr lang="pt-PT" sz="1400" dirty="0"/>
               <a:t> tiles are </a:t>
             </a:r>
             <a:r>
-              <a:rPr lang="pt-PT" dirty="0" err="1"/>
+              <a:rPr lang="pt-PT" sz="1400" dirty="0" err="1"/>
               <a:t>represented</a:t>
             </a:r>
             <a:r>
-              <a:rPr lang="pt-PT" dirty="0"/>
+              <a:rPr lang="pt-PT" sz="1400" dirty="0"/>
               <a:t> </a:t>
             </a:r>
             <a:r>
-              <a:rPr lang="pt-PT" dirty="0" err="1"/>
+              <a:rPr lang="pt-PT" sz="1400" dirty="0" err="1"/>
               <a:t>with</a:t>
             </a:r>
             <a:r>
-              <a:rPr lang="pt-PT" dirty="0"/>
+              <a:rPr lang="pt-PT" sz="1400" dirty="0"/>
               <a:t> a 1 </a:t>
             </a:r>
             <a:r>
-              <a:rPr lang="pt-PT" dirty="0" err="1"/>
+              <a:rPr lang="pt-PT" sz="1400" dirty="0" err="1"/>
               <a:t>and</a:t>
             </a:r>
             <a:r>
-              <a:rPr lang="pt-PT" dirty="0"/>
+              <a:rPr lang="pt-PT" sz="1400" dirty="0"/>
               <a:t> </a:t>
             </a:r>
             <a:r>
-              <a:rPr lang="pt-PT" dirty="0" err="1"/>
+              <a:rPr lang="pt-PT" sz="1400" dirty="0" err="1"/>
               <a:t>the</a:t>
             </a:r>
             <a:r>
-              <a:rPr lang="pt-PT" dirty="0"/>
+              <a:rPr lang="pt-PT" sz="1400" dirty="0"/>
               <a:t> </a:t>
             </a:r>
             <a:r>
-              <a:rPr lang="pt-PT" dirty="0" err="1"/>
+              <a:rPr lang="pt-PT" sz="1400" dirty="0" err="1"/>
               <a:t>empty</a:t>
             </a:r>
             <a:r>
-              <a:rPr lang="pt-PT" dirty="0"/>
+              <a:rPr lang="pt-PT" sz="1400" dirty="0"/>
               <a:t> tiles </a:t>
             </a:r>
             <a:r>
-              <a:rPr lang="pt-PT" dirty="0" err="1"/>
+              <a:rPr lang="pt-PT" sz="1400" dirty="0" err="1"/>
               <a:t>with</a:t>
             </a:r>
             <a:r>
-              <a:rPr lang="pt-PT" dirty="0"/>
-              <a:t> a 0. </a:t>
-            </a:r>
-            <a:r>
-              <a:rPr lang="pt-PT" dirty="0" err="1"/>
-              <a:t>Each</a:t>
-            </a:r>
-            <a:r>
-              <a:rPr lang="pt-PT" dirty="0"/>
+              <a:rPr lang="pt-PT" sz="1400" dirty="0"/>
+              <a:t> a 0. Each chess piece has its own type and position as well as a counter that counts each time it attacks the snake, a list containing all the positions where it can attack. Every tile has a position (x, y) to store the corresponding index of the matrix  and theres also a snake object which stores the path selected.</a:t>
+            </a:r>
+            <a:endParaRPr sz="1400" dirty="0"/>
+          </a:p>
+          <a:p>
+            <a:pPr>
+              <a:defRPr/>
+            </a:pPr>
+            <a:r>
+              <a:rPr lang="pt-PT" sz="1400" dirty="0"/>
+              <a:t>Initial state: The initial state is represented with the given chess tiles defined in the board, the start and finish tiles well-marked, snake path with the initial tile and cost stars at 0  .</a:t>
+            </a:r>
+            <a:endParaRPr sz="1400" dirty="0"/>
+          </a:p>
+          <a:p>
+            <a:pPr>
+              <a:defRPr/>
+            </a:pPr>
+            <a:r>
+              <a:rPr lang="pt-PT" sz="1400" dirty="0"/>
+              <a:t>Final </a:t>
+            </a:r>
+            <a:r>
+              <a:rPr lang="pt-PT" sz="1400" dirty="0" err="1"/>
+              <a:t>state</a:t>
+            </a:r>
+            <a:r>
+              <a:rPr lang="pt-PT" sz="1400" dirty="0"/>
+              <a:t>: </a:t>
+            </a:r>
+            <a:r>
+              <a:rPr lang="pt-PT" sz="1400" dirty="0" err="1"/>
+              <a:t>state</a:t>
+            </a:r>
+            <a:r>
+              <a:rPr lang="pt-PT" sz="1400" dirty="0"/>
               <a:t> </a:t>
             </a:r>
             <a:r>
-              <a:rPr lang="pt-PT" dirty="0" err="1"/>
-              <a:t>chess</a:t>
-            </a:r>
-            <a:r>
-              <a:rPr lang="pt-PT" dirty="0"/>
+              <a:rPr lang="pt-PT" sz="1400" dirty="0" err="1"/>
+              <a:t>with</a:t>
+            </a:r>
+            <a:r>
+              <a:rPr lang="pt-PT" sz="1400" dirty="0"/>
+              <a:t> a </a:t>
+            </a:r>
+            <a:r>
+              <a:rPr lang="pt-PT" sz="1400" dirty="0" err="1"/>
+              <a:t>chosen</a:t>
+            </a:r>
+            <a:r>
+              <a:rPr lang="pt-PT" sz="1400" dirty="0"/>
               <a:t> </a:t>
             </a:r>
             <a:r>
-              <a:rPr lang="pt-PT" dirty="0" err="1"/>
-              <a:t>piece</a:t>
-            </a:r>
-            <a:r>
-              <a:rPr lang="pt-PT" dirty="0"/>
+              <a:rPr lang="pt-PT" sz="1400" dirty="0" err="1"/>
+              <a:t>path</a:t>
+            </a:r>
+            <a:r>
+              <a:rPr lang="pt-PT" sz="1400" dirty="0"/>
               <a:t> </a:t>
             </a:r>
             <a:r>
-              <a:rPr lang="pt-PT" dirty="0" err="1"/>
-              <a:t>has</a:t>
-            </a:r>
-            <a:r>
-              <a:rPr lang="pt-PT" dirty="0"/>
-              <a:t> a </a:t>
-            </a:r>
-            <a:r>
-              <a:rPr lang="pt-PT" dirty="0" err="1"/>
-              <a:t>counter</a:t>
-            </a:r>
-            <a:r>
-              <a:rPr lang="pt-PT" dirty="0"/>
+              <a:rPr lang="pt-PT" sz="1400" dirty="0" err="1"/>
+              <a:t>which</a:t>
+            </a:r>
+            <a:r>
+              <a:rPr lang="pt-PT" sz="1400" dirty="0"/>
               <a:t> </a:t>
             </a:r>
             <a:r>
-              <a:rPr lang="pt-PT" dirty="0" err="1"/>
-              <a:t>that</a:t>
-            </a:r>
-            <a:r>
-              <a:rPr lang="pt-PT" dirty="0"/>
+              <a:rPr lang="pt-PT" sz="1400" dirty="0" err="1"/>
+              <a:t>may</a:t>
+            </a:r>
+            <a:r>
+              <a:rPr lang="pt-PT" sz="1400" dirty="0"/>
               <a:t> </a:t>
             </a:r>
             <a:r>
-              <a:rPr lang="pt-PT" dirty="0" err="1"/>
-              <a:t>counts</a:t>
-            </a:r>
-            <a:r>
-              <a:rPr lang="pt-PT" dirty="0"/>
+              <a:rPr lang="pt-PT" sz="1400" dirty="0" err="1"/>
+              <a:t>follow</a:t>
+            </a:r>
+            <a:r>
+              <a:rPr lang="pt-PT" sz="1400" dirty="0"/>
               <a:t> </a:t>
             </a:r>
             <a:r>
-              <a:rPr lang="pt-PT" dirty="0" err="1"/>
-              <a:t>each</a:t>
-            </a:r>
-            <a:r>
-              <a:rPr lang="pt-PT" dirty="0"/>
-              <a:t> time </a:t>
-            </a:r>
-            <a:r>
-              <a:rPr lang="pt-PT" dirty="0" err="1"/>
-              <a:t>it</a:t>
-            </a:r>
-            <a:r>
-              <a:rPr lang="pt-PT" dirty="0"/>
-              <a:t> </a:t>
-            </a:r>
-            <a:r>
-              <a:rPr lang="pt-PT" dirty="0" err="1"/>
-              <a:t>attacks</a:t>
-            </a:r>
-            <a:r>
-              <a:rPr lang="pt-PT" dirty="0"/>
-              <a:t> </a:t>
-            </a:r>
-            <a:r>
-              <a:rPr lang="pt-PT" dirty="0" err="1"/>
+              <a:rPr lang="pt-PT" sz="1400" dirty="0" err="1"/>
               <a:t>the</a:t>
             </a:r>
             <a:r>
-              <a:rPr lang="pt-PT" dirty="0"/>
-              <a:t> </a:t>
-            </a:r>
-            <a:r>
-              <a:rPr lang="pt-PT" dirty="0" err="1"/>
-              <a:t>snake</a:t>
-            </a:r>
-            <a:r>
-              <a:rPr lang="pt-PT" dirty="0"/>
-              <a:t>. </a:t>
-            </a:r>
-            <a:r>
-              <a:rPr lang="pt-PT" dirty="0" err="1"/>
-              <a:t>Every</a:t>
-            </a:r>
-            <a:r>
-              <a:rPr lang="pt-PT" dirty="0"/>
-              <a:t> tile </a:t>
-            </a:r>
-            <a:r>
-              <a:rPr lang="pt-PT" dirty="0" err="1"/>
-              <a:t>has</a:t>
-            </a:r>
-            <a:r>
-              <a:rPr lang="pt-PT" dirty="0"/>
-              <a:t> a </a:t>
-            </a:r>
-            <a:r>
-              <a:rPr lang="pt-PT" dirty="0" err="1"/>
-              <a:t>position</a:t>
-            </a:r>
-            <a:r>
-              <a:rPr lang="pt-PT" dirty="0"/>
-              <a:t> (x, y) to </a:t>
-            </a:r>
-            <a:r>
-              <a:rPr lang="pt-PT" dirty="0" err="1"/>
-              <a:t>store</a:t>
-            </a:r>
-            <a:r>
-              <a:rPr lang="pt-PT" dirty="0"/>
-              <a:t> </a:t>
-            </a:r>
-            <a:r>
-              <a:rPr lang="pt-PT" dirty="0" err="1"/>
+              <a:rPr lang="pt-PT" sz="1400" dirty="0"/>
+              <a:t> rules </a:t>
+            </a:r>
+            <a:r>
+              <a:rPr lang="pt-PT" sz="1400" dirty="0" err="1"/>
+              <a:t>defined</a:t>
+            </a:r>
+            <a:r>
+              <a:rPr lang="pt-PT" sz="1400" dirty="0"/>
+              <a:t> in </a:t>
+            </a:r>
+            <a:r>
+              <a:rPr lang="pt-PT" sz="1400" dirty="0" err="1"/>
               <a:t>the</a:t>
             </a:r>
             <a:r>
-              <a:rPr lang="pt-PT" dirty="0"/>
-              <a:t> </a:t>
-            </a:r>
-            <a:r>
-              <a:rPr lang="pt-PT" dirty="0" err="1"/>
-              <a:t>corresponding</a:t>
-            </a:r>
-            <a:r>
-              <a:rPr lang="pt-PT" dirty="0"/>
-              <a:t> </a:t>
-            </a:r>
-            <a:r>
-              <a:rPr lang="pt-PT" dirty="0" err="1"/>
-              <a:t>index</a:t>
-            </a:r>
-            <a:r>
-              <a:rPr lang="pt-PT" dirty="0"/>
-              <a:t> </a:t>
-            </a:r>
-            <a:r>
-              <a:rPr lang="pt-PT" dirty="0" err="1"/>
-              <a:t>of</a:t>
-            </a:r>
-            <a:r>
-              <a:rPr lang="pt-PT" dirty="0"/>
-              <a:t> </a:t>
-            </a:r>
-            <a:r>
-              <a:rPr lang="pt-PT" dirty="0" err="1"/>
-              <a:t>the</a:t>
-            </a:r>
-            <a:r>
-              <a:rPr lang="pt-PT" dirty="0"/>
-              <a:t> </a:t>
-            </a:r>
-            <a:r>
-              <a:rPr lang="pt-PT" dirty="0" err="1"/>
-              <a:t>matrix</a:t>
-            </a:r>
-            <a:r>
-              <a:rPr lang="pt-PT" dirty="0"/>
-              <a:t> </a:t>
-            </a:r>
-            <a:r>
-              <a:rPr lang="pt-PT" dirty="0" err="1"/>
-              <a:t>and</a:t>
-            </a:r>
-            <a:r>
-              <a:rPr lang="pt-PT" dirty="0"/>
-              <a:t> a </a:t>
-            </a:r>
-            <a:r>
-              <a:rPr lang="pt-PT" dirty="0" err="1"/>
-              <a:t>bool</a:t>
-            </a:r>
-            <a:r>
-              <a:rPr lang="pt-PT" dirty="0"/>
-              <a:t> to </a:t>
-            </a:r>
-            <a:r>
-              <a:rPr lang="pt-PT" dirty="0" err="1"/>
-              <a:t>know</a:t>
-            </a:r>
-            <a:r>
-              <a:rPr lang="pt-PT" dirty="0"/>
-              <a:t> </a:t>
-            </a:r>
-            <a:r>
-              <a:rPr lang="pt-PT" dirty="0" err="1"/>
-              <a:t>if</a:t>
-            </a:r>
-            <a:r>
-              <a:rPr lang="pt-PT" dirty="0"/>
-              <a:t> </a:t>
-            </a:r>
-            <a:r>
-              <a:rPr lang="pt-PT" dirty="0" err="1"/>
-              <a:t>the</a:t>
-            </a:r>
-            <a:r>
-              <a:rPr lang="pt-PT" dirty="0"/>
-              <a:t> tile </a:t>
-            </a:r>
-            <a:r>
-              <a:rPr lang="pt-PT" dirty="0" err="1"/>
-              <a:t>is</a:t>
-            </a:r>
-            <a:r>
-              <a:rPr lang="pt-PT" dirty="0"/>
-              <a:t> </a:t>
-            </a:r>
-            <a:r>
-              <a:rPr lang="pt-PT" dirty="0" err="1"/>
-              <a:t>being</a:t>
-            </a:r>
-            <a:r>
-              <a:rPr lang="pt-PT" dirty="0"/>
-              <a:t> </a:t>
-            </a:r>
-            <a:r>
-              <a:rPr lang="pt-PT" dirty="0" err="1"/>
-              <a:t>attacked</a:t>
-            </a:r>
-            <a:r>
-              <a:rPr lang="pt-PT" dirty="0"/>
-              <a:t> </a:t>
-            </a:r>
-            <a:r>
-              <a:rPr lang="pt-PT" dirty="0" err="1"/>
-              <a:t>or</a:t>
-            </a:r>
-            <a:r>
-              <a:rPr lang="pt-PT" dirty="0"/>
-              <a:t> </a:t>
-            </a:r>
-            <a:r>
-              <a:rPr lang="pt-PT" dirty="0" err="1"/>
-              <a:t>not</a:t>
-            </a:r>
-            <a:r>
-              <a:rPr lang="pt-PT" dirty="0"/>
-              <a:t>.</a:t>
-            </a:r>
-            <a:endParaRPr dirty="0"/>
+              <a:rPr lang="pt-PT" sz="1400" dirty="0"/>
+              <a:t> game </a:t>
+            </a:r>
+            <a:r>
+              <a:rPr lang="pt-PT" sz="1400" dirty="0" err="1"/>
+              <a:t>description</a:t>
+            </a:r>
+            <a:r>
+              <a:rPr lang="pt-PT" sz="1400" dirty="0"/>
+              <a:t>. So it will be a matrix similiar with the initial state but, in this case, with the tiles representing the solution path marked with a 1.</a:t>
+            </a:r>
+            <a:endParaRPr sz="1400" dirty="0"/>
           </a:p>
           <a:p>
             <a:pPr>
               <a:defRPr/>
             </a:pPr>
             <a:r>
-              <a:rPr lang="pt-PT" dirty="0" err="1"/>
-              <a:t>Initial</a:t>
-            </a:r>
-            <a:r>
-              <a:rPr lang="pt-PT" dirty="0"/>
-              <a:t> </a:t>
-            </a:r>
-            <a:r>
-              <a:rPr lang="pt-PT" dirty="0" err="1"/>
-              <a:t>state</a:t>
-            </a:r>
-            <a:r>
-              <a:rPr lang="pt-PT" dirty="0"/>
-              <a:t>: </a:t>
-            </a:r>
-            <a:r>
-              <a:rPr lang="pt-PT" dirty="0" err="1"/>
-              <a:t>The</a:t>
-            </a:r>
-            <a:r>
-              <a:rPr lang="pt-PT" dirty="0"/>
-              <a:t> </a:t>
-            </a:r>
-            <a:r>
-              <a:rPr lang="pt-PT" dirty="0" err="1"/>
-              <a:t>initial</a:t>
-            </a:r>
-            <a:r>
-              <a:rPr lang="pt-PT" dirty="0"/>
-              <a:t> </a:t>
-            </a:r>
-            <a:r>
-              <a:rPr lang="pt-PT" dirty="0" err="1"/>
-              <a:t>state</a:t>
-            </a:r>
-            <a:r>
-              <a:rPr lang="pt-PT" dirty="0"/>
-              <a:t> </a:t>
-            </a:r>
-            <a:r>
-              <a:rPr lang="pt-PT" dirty="0" err="1"/>
-              <a:t>is</a:t>
-            </a:r>
-            <a:r>
-              <a:rPr lang="pt-PT" dirty="0"/>
-              <a:t> </a:t>
-            </a:r>
-            <a:r>
-              <a:rPr lang="pt-PT" dirty="0" err="1"/>
-              <a:t>represented</a:t>
-            </a:r>
-            <a:r>
-              <a:rPr lang="pt-PT" dirty="0"/>
-              <a:t> </a:t>
-            </a:r>
-            <a:r>
-              <a:rPr lang="pt-PT" dirty="0" err="1"/>
-              <a:t>with</a:t>
-            </a:r>
-            <a:r>
-              <a:rPr lang="pt-PT" dirty="0"/>
-              <a:t> </a:t>
-            </a:r>
-            <a:r>
-              <a:rPr lang="pt-PT" dirty="0" err="1"/>
-              <a:t>the</a:t>
-            </a:r>
-            <a:r>
-              <a:rPr lang="pt-PT" dirty="0"/>
-              <a:t> </a:t>
-            </a:r>
-            <a:r>
-              <a:rPr lang="pt-PT" dirty="0" err="1"/>
-              <a:t>given</a:t>
-            </a:r>
-            <a:r>
-              <a:rPr lang="pt-PT" dirty="0"/>
-              <a:t> </a:t>
-            </a:r>
-            <a:r>
-              <a:rPr lang="pt-PT" dirty="0" err="1"/>
-              <a:t>chess</a:t>
-            </a:r>
-            <a:r>
-              <a:rPr lang="pt-PT" dirty="0"/>
-              <a:t> tiles </a:t>
-            </a:r>
-            <a:r>
-              <a:rPr lang="pt-PT" dirty="0" err="1"/>
-              <a:t>defined</a:t>
-            </a:r>
-            <a:r>
-              <a:rPr lang="pt-PT" dirty="0"/>
-              <a:t> in </a:t>
-            </a:r>
-            <a:r>
-              <a:rPr lang="pt-PT" dirty="0" err="1"/>
-              <a:t>the</a:t>
-            </a:r>
-            <a:r>
-              <a:rPr lang="pt-PT" dirty="0"/>
-              <a:t> </a:t>
-            </a:r>
-            <a:r>
-              <a:rPr lang="pt-PT" dirty="0" err="1"/>
-              <a:t>board</a:t>
-            </a:r>
-            <a:r>
-              <a:rPr lang="pt-PT" dirty="0"/>
-              <a:t> </a:t>
-            </a:r>
-            <a:r>
-              <a:rPr lang="pt-PT" dirty="0" err="1"/>
-              <a:t>and</a:t>
-            </a:r>
-            <a:r>
-              <a:rPr lang="pt-PT" dirty="0"/>
-              <a:t> </a:t>
-            </a:r>
-            <a:r>
-              <a:rPr lang="pt-PT" dirty="0" err="1"/>
-              <a:t>the</a:t>
-            </a:r>
-            <a:r>
-              <a:rPr lang="pt-PT" dirty="0"/>
-              <a:t> </a:t>
-            </a:r>
-            <a:r>
-              <a:rPr lang="pt-PT" dirty="0" err="1"/>
-              <a:t>start</a:t>
-            </a:r>
-            <a:r>
-              <a:rPr lang="pt-PT" dirty="0"/>
-              <a:t> </a:t>
-            </a:r>
-            <a:r>
-              <a:rPr lang="pt-PT" dirty="0" err="1"/>
-              <a:t>and</a:t>
-            </a:r>
-            <a:r>
-              <a:rPr lang="pt-PT" dirty="0"/>
-              <a:t> </a:t>
-            </a:r>
-            <a:r>
-              <a:rPr lang="pt-PT" dirty="0" err="1"/>
-              <a:t>finish</a:t>
-            </a:r>
-            <a:r>
-              <a:rPr lang="pt-PT" dirty="0"/>
-              <a:t> tiles </a:t>
-            </a:r>
-            <a:r>
-              <a:rPr lang="pt-PT" dirty="0" err="1"/>
-              <a:t>well-marked</a:t>
-            </a:r>
-            <a:r>
-              <a:rPr lang="pt-PT" dirty="0"/>
-              <a:t> as </a:t>
-            </a:r>
-            <a:r>
-              <a:rPr lang="pt-PT" dirty="0" err="1"/>
-              <a:t>well</a:t>
-            </a:r>
-            <a:r>
-              <a:rPr lang="pt-PT" dirty="0"/>
-              <a:t>.</a:t>
-            </a:r>
-            <a:endParaRPr dirty="0"/>
+              <a:rPr lang="pt-PT" sz="1400" dirty="0"/>
+              <a:t>Solution Cost – Each move costs 1, so the final cost will be the total length of the snake. </a:t>
+            </a:r>
           </a:p>
           <a:p>
             <a:pPr>
               <a:defRPr/>
             </a:pPr>
             <a:r>
-              <a:rPr lang="pt-PT" dirty="0"/>
-              <a:t>Final </a:t>
-            </a:r>
-            <a:r>
-              <a:rPr lang="pt-PT" dirty="0" err="1"/>
-              <a:t>state</a:t>
-            </a:r>
-            <a:r>
-              <a:rPr lang="pt-PT" dirty="0"/>
-              <a:t>: </a:t>
-            </a:r>
-            <a:r>
-              <a:rPr lang="pt-PT" dirty="0" err="1"/>
-              <a:t>state</a:t>
-            </a:r>
-            <a:r>
-              <a:rPr lang="pt-PT" dirty="0"/>
-              <a:t> </a:t>
-            </a:r>
-            <a:r>
-              <a:rPr lang="pt-PT" dirty="0" err="1"/>
-              <a:t>with</a:t>
-            </a:r>
-            <a:r>
-              <a:rPr lang="pt-PT" dirty="0"/>
-              <a:t> a </a:t>
-            </a:r>
-            <a:r>
-              <a:rPr lang="pt-PT" dirty="0" err="1"/>
-              <a:t>chosen</a:t>
-            </a:r>
-            <a:r>
-              <a:rPr lang="pt-PT" dirty="0"/>
-              <a:t> </a:t>
-            </a:r>
-            <a:r>
-              <a:rPr lang="pt-PT" dirty="0" err="1"/>
-              <a:t>path</a:t>
-            </a:r>
-            <a:r>
-              <a:rPr lang="pt-PT" dirty="0"/>
-              <a:t> </a:t>
-            </a:r>
-            <a:r>
-              <a:rPr lang="pt-PT" dirty="0" err="1"/>
-              <a:t>which</a:t>
-            </a:r>
-            <a:r>
-              <a:rPr lang="pt-PT" dirty="0"/>
-              <a:t> </a:t>
-            </a:r>
-            <a:r>
-              <a:rPr lang="pt-PT" dirty="0" err="1"/>
-              <a:t>may</a:t>
-            </a:r>
-            <a:r>
-              <a:rPr lang="pt-PT" dirty="0"/>
-              <a:t> </a:t>
-            </a:r>
-            <a:r>
-              <a:rPr lang="pt-PT" dirty="0" err="1"/>
-              <a:t>follow</a:t>
-            </a:r>
-            <a:r>
-              <a:rPr lang="pt-PT" dirty="0"/>
-              <a:t> </a:t>
-            </a:r>
-            <a:r>
-              <a:rPr lang="pt-PT" dirty="0" err="1"/>
-              <a:t>the</a:t>
-            </a:r>
-            <a:r>
-              <a:rPr lang="pt-PT" dirty="0"/>
-              <a:t> rules </a:t>
-            </a:r>
-            <a:r>
-              <a:rPr lang="pt-PT" dirty="0" err="1"/>
-              <a:t>defined</a:t>
-            </a:r>
-            <a:r>
-              <a:rPr lang="pt-PT" dirty="0"/>
-              <a:t> in </a:t>
-            </a:r>
-            <a:r>
-              <a:rPr lang="pt-PT" dirty="0" err="1"/>
-              <a:t>the</a:t>
-            </a:r>
-            <a:r>
-              <a:rPr lang="pt-PT" dirty="0"/>
-              <a:t> game </a:t>
-            </a:r>
-            <a:r>
-              <a:rPr lang="pt-PT" dirty="0" err="1"/>
-              <a:t>description</a:t>
-            </a:r>
-            <a:r>
-              <a:rPr lang="pt-PT" dirty="0"/>
-              <a:t>. </a:t>
-            </a:r>
-            <a:r>
-              <a:rPr lang="pt-PT" dirty="0" err="1"/>
-              <a:t>So</a:t>
-            </a:r>
-            <a:r>
-              <a:rPr lang="pt-PT" dirty="0"/>
-              <a:t> </a:t>
-            </a:r>
-            <a:r>
-              <a:rPr lang="pt-PT" dirty="0" err="1"/>
-              <a:t>it</a:t>
-            </a:r>
-            <a:r>
-              <a:rPr lang="pt-PT" dirty="0"/>
-              <a:t> </a:t>
-            </a:r>
-            <a:r>
-              <a:rPr lang="pt-PT" dirty="0" err="1"/>
-              <a:t>will</a:t>
-            </a:r>
-            <a:r>
-              <a:rPr lang="pt-PT" dirty="0"/>
-              <a:t> </a:t>
-            </a:r>
-            <a:r>
-              <a:rPr lang="pt-PT" dirty="0" err="1"/>
-              <a:t>be</a:t>
-            </a:r>
-            <a:r>
-              <a:rPr lang="pt-PT" dirty="0"/>
-              <a:t> a </a:t>
-            </a:r>
-            <a:r>
-              <a:rPr lang="pt-PT" dirty="0" err="1"/>
-              <a:t>matrix</a:t>
-            </a:r>
-            <a:r>
-              <a:rPr lang="pt-PT" dirty="0"/>
-              <a:t> </a:t>
-            </a:r>
-            <a:r>
-              <a:rPr lang="pt-PT" dirty="0" err="1"/>
-              <a:t>similiar</a:t>
-            </a:r>
-            <a:r>
-              <a:rPr lang="pt-PT" dirty="0"/>
-              <a:t> </a:t>
-            </a:r>
-            <a:r>
-              <a:rPr lang="pt-PT" dirty="0" err="1"/>
-              <a:t>with</a:t>
-            </a:r>
-            <a:r>
-              <a:rPr lang="pt-PT" dirty="0"/>
-              <a:t> </a:t>
-            </a:r>
-            <a:r>
-              <a:rPr lang="pt-PT" dirty="0" err="1"/>
-              <a:t>the</a:t>
-            </a:r>
-            <a:r>
-              <a:rPr lang="pt-PT" dirty="0"/>
-              <a:t> </a:t>
-            </a:r>
-            <a:r>
-              <a:rPr lang="pt-PT" dirty="0" err="1"/>
-              <a:t>initial</a:t>
-            </a:r>
-            <a:r>
-              <a:rPr lang="pt-PT" dirty="0"/>
-              <a:t> </a:t>
-            </a:r>
-            <a:r>
-              <a:rPr lang="pt-PT" dirty="0" err="1"/>
-              <a:t>state</a:t>
-            </a:r>
-            <a:r>
-              <a:rPr lang="pt-PT" dirty="0"/>
-              <a:t> </a:t>
-            </a:r>
-            <a:r>
-              <a:rPr lang="pt-PT" dirty="0" err="1"/>
-              <a:t>but</a:t>
-            </a:r>
-            <a:r>
-              <a:rPr lang="pt-PT" dirty="0"/>
-              <a:t>, in </a:t>
-            </a:r>
-            <a:r>
-              <a:rPr lang="pt-PT" dirty="0" err="1"/>
-              <a:t>this</a:t>
-            </a:r>
-            <a:r>
-              <a:rPr lang="pt-PT" dirty="0"/>
-              <a:t> case, </a:t>
-            </a:r>
-            <a:r>
-              <a:rPr lang="pt-PT" dirty="0" err="1"/>
-              <a:t>with</a:t>
-            </a:r>
-            <a:r>
-              <a:rPr lang="pt-PT" dirty="0"/>
-              <a:t> </a:t>
-            </a:r>
-            <a:r>
-              <a:rPr lang="pt-PT" dirty="0" err="1"/>
-              <a:t>the</a:t>
-            </a:r>
-            <a:r>
-              <a:rPr lang="pt-PT" dirty="0"/>
-              <a:t> tiles </a:t>
-            </a:r>
-            <a:r>
-              <a:rPr lang="pt-PT" dirty="0" err="1"/>
-              <a:t>representing</a:t>
-            </a:r>
-            <a:r>
-              <a:rPr lang="pt-PT" dirty="0"/>
-              <a:t> </a:t>
-            </a:r>
-            <a:r>
-              <a:rPr lang="pt-PT" dirty="0" err="1"/>
-              <a:t>the</a:t>
-            </a:r>
-            <a:r>
-              <a:rPr lang="pt-PT" dirty="0"/>
-              <a:t> </a:t>
-            </a:r>
-            <a:r>
-              <a:rPr lang="pt-PT" dirty="0" err="1"/>
-              <a:t>solution</a:t>
-            </a:r>
-            <a:r>
-              <a:rPr lang="pt-PT" dirty="0"/>
-              <a:t> </a:t>
-            </a:r>
-            <a:r>
-              <a:rPr lang="pt-PT" dirty="0" err="1"/>
-              <a:t>path</a:t>
-            </a:r>
-            <a:r>
-              <a:rPr lang="pt-PT" dirty="0"/>
-              <a:t> </a:t>
-            </a:r>
-            <a:r>
-              <a:rPr lang="pt-PT" dirty="0" err="1"/>
-              <a:t>marked</a:t>
-            </a:r>
-            <a:r>
-              <a:rPr lang="pt-PT" dirty="0"/>
-              <a:t> </a:t>
-            </a:r>
-            <a:r>
-              <a:rPr lang="pt-PT" dirty="0" err="1"/>
-              <a:t>with</a:t>
-            </a:r>
-            <a:r>
-              <a:rPr lang="pt-PT" dirty="0"/>
-              <a:t> a 1.</a:t>
-            </a:r>
-            <a:endParaRPr dirty="0"/>
-          </a:p>
-          <a:p>
-            <a:pPr>
-              <a:defRPr/>
-            </a:pPr>
-            <a:r>
-              <a:rPr lang="pt-PT" dirty="0" err="1"/>
-              <a:t>Solution</a:t>
-            </a:r>
-            <a:r>
-              <a:rPr lang="pt-PT" dirty="0"/>
-              <a:t> </a:t>
-            </a:r>
-            <a:r>
-              <a:rPr lang="pt-PT" dirty="0" err="1"/>
-              <a:t>Cost</a:t>
-            </a:r>
-            <a:r>
-              <a:rPr lang="pt-PT" dirty="0"/>
-              <a:t> – </a:t>
-            </a:r>
-            <a:r>
-              <a:rPr lang="pt-PT" dirty="0" err="1"/>
-              <a:t>Each</a:t>
-            </a:r>
-            <a:r>
-              <a:rPr lang="pt-PT" dirty="0"/>
-              <a:t> move </a:t>
-            </a:r>
-            <a:r>
-              <a:rPr lang="pt-PT" dirty="0" err="1"/>
-              <a:t>costs</a:t>
-            </a:r>
-            <a:r>
-              <a:rPr lang="pt-PT" dirty="0"/>
-              <a:t> 1, </a:t>
-            </a:r>
-            <a:r>
-              <a:rPr lang="pt-PT" dirty="0" err="1"/>
-              <a:t>so</a:t>
-            </a:r>
-            <a:r>
-              <a:rPr lang="pt-PT" dirty="0"/>
-              <a:t> </a:t>
-            </a:r>
-            <a:r>
-              <a:rPr lang="pt-PT" dirty="0" err="1"/>
-              <a:t>the</a:t>
-            </a:r>
-            <a:r>
-              <a:rPr lang="pt-PT" dirty="0"/>
-              <a:t> final </a:t>
-            </a:r>
-            <a:r>
-              <a:rPr lang="pt-PT" dirty="0" err="1"/>
-              <a:t>cost</a:t>
-            </a:r>
-            <a:r>
-              <a:rPr lang="pt-PT" dirty="0"/>
-              <a:t> </a:t>
-            </a:r>
-            <a:r>
-              <a:rPr lang="pt-PT" dirty="0" err="1"/>
-              <a:t>will</a:t>
-            </a:r>
-            <a:r>
-              <a:rPr lang="pt-PT" dirty="0"/>
-              <a:t> </a:t>
-            </a:r>
-            <a:r>
-              <a:rPr lang="pt-PT" dirty="0" err="1"/>
-              <a:t>be</a:t>
-            </a:r>
-            <a:r>
-              <a:rPr lang="pt-PT" dirty="0"/>
-              <a:t> </a:t>
-            </a:r>
-            <a:r>
-              <a:rPr lang="pt-PT" dirty="0" err="1"/>
-              <a:t>the</a:t>
-            </a:r>
-            <a:r>
-              <a:rPr lang="pt-PT" dirty="0"/>
-              <a:t> total </a:t>
-            </a:r>
-            <a:r>
-              <a:rPr lang="pt-PT" dirty="0" err="1"/>
-              <a:t>length</a:t>
-            </a:r>
-            <a:r>
-              <a:rPr lang="pt-PT" dirty="0"/>
-              <a:t> </a:t>
-            </a:r>
-            <a:r>
-              <a:rPr lang="pt-PT" dirty="0" err="1"/>
-              <a:t>of</a:t>
-            </a:r>
-            <a:r>
-              <a:rPr lang="pt-PT" dirty="0"/>
-              <a:t> </a:t>
-            </a:r>
-            <a:r>
-              <a:rPr lang="pt-PT" dirty="0" err="1"/>
-              <a:t>the</a:t>
-            </a:r>
-            <a:r>
-              <a:rPr lang="pt-PT" dirty="0"/>
-              <a:t> </a:t>
-            </a:r>
-            <a:r>
-              <a:rPr lang="pt-PT" dirty="0" err="1"/>
-              <a:t>snake</a:t>
-            </a:r>
-            <a:r>
-              <a:rPr lang="pt-PT" dirty="0"/>
-              <a:t>. (</a:t>
-            </a:r>
-            <a:r>
-              <a:rPr lang="pt-PT" b="1" dirty="0"/>
-              <a:t>to </a:t>
-            </a:r>
-            <a:r>
-              <a:rPr lang="pt-PT" b="1" dirty="0" err="1"/>
-              <a:t>be</a:t>
-            </a:r>
-            <a:r>
-              <a:rPr lang="pt-PT" b="1" dirty="0"/>
-              <a:t> </a:t>
-            </a:r>
-            <a:r>
-              <a:rPr lang="pt-PT" b="1" dirty="0" err="1"/>
-              <a:t>checked</a:t>
-            </a:r>
-            <a:r>
-              <a:rPr lang="pt-PT" dirty="0"/>
-              <a:t>)</a:t>
-            </a:r>
-            <a:endParaRPr dirty="0"/>
-          </a:p>
-          <a:p>
-            <a:pPr>
-              <a:defRPr/>
-            </a:pPr>
-            <a:r>
-              <a:rPr lang="pt-PT" dirty="0" err="1"/>
-              <a:t>Heuristic</a:t>
-            </a:r>
-            <a:r>
-              <a:rPr lang="pt-PT" dirty="0"/>
-              <a:t> – As </a:t>
-            </a:r>
-            <a:r>
-              <a:rPr lang="pt-PT" dirty="0" err="1"/>
-              <a:t>the</a:t>
-            </a:r>
-            <a:r>
-              <a:rPr lang="pt-PT" dirty="0"/>
-              <a:t> </a:t>
-            </a:r>
-            <a:r>
-              <a:rPr lang="pt-PT" dirty="0" err="1"/>
-              <a:t>main</a:t>
-            </a:r>
-            <a:r>
-              <a:rPr lang="pt-PT" dirty="0"/>
-              <a:t> </a:t>
-            </a:r>
-            <a:r>
-              <a:rPr lang="pt-PT" dirty="0" err="1"/>
-              <a:t>goal</a:t>
-            </a:r>
-            <a:r>
-              <a:rPr lang="pt-PT" dirty="0"/>
-              <a:t> </a:t>
-            </a:r>
-            <a:r>
-              <a:rPr lang="pt-PT" dirty="0" err="1"/>
-              <a:t>of</a:t>
-            </a:r>
-            <a:r>
-              <a:rPr lang="pt-PT" dirty="0"/>
-              <a:t> </a:t>
-            </a:r>
-            <a:r>
-              <a:rPr lang="pt-PT" dirty="0" err="1"/>
-              <a:t>the</a:t>
-            </a:r>
-            <a:r>
-              <a:rPr lang="pt-PT" dirty="0"/>
-              <a:t> puzzle </a:t>
-            </a:r>
-            <a:r>
-              <a:rPr lang="pt-PT" dirty="0" err="1"/>
-              <a:t>is</a:t>
-            </a:r>
-            <a:r>
-              <a:rPr lang="pt-PT" dirty="0"/>
-              <a:t> to </a:t>
-            </a:r>
-            <a:r>
-              <a:rPr lang="pt-PT" dirty="0" err="1"/>
-              <a:t>find</a:t>
-            </a:r>
-            <a:r>
-              <a:rPr lang="pt-PT" dirty="0"/>
-              <a:t> a </a:t>
-            </a:r>
-            <a:r>
-              <a:rPr lang="pt-PT" dirty="0" err="1"/>
-              <a:t>way</a:t>
-            </a:r>
-            <a:r>
-              <a:rPr lang="pt-PT" dirty="0"/>
-              <a:t> to </a:t>
-            </a:r>
-            <a:r>
-              <a:rPr lang="pt-PT" dirty="0" err="1"/>
-              <a:t>connect</a:t>
-            </a:r>
-            <a:r>
-              <a:rPr lang="pt-PT" dirty="0"/>
-              <a:t> </a:t>
-            </a:r>
-            <a:r>
-              <a:rPr lang="pt-PT" dirty="0" err="1"/>
-              <a:t>the</a:t>
-            </a:r>
-            <a:r>
-              <a:rPr lang="pt-PT" dirty="0"/>
-              <a:t> 2 </a:t>
-            </a:r>
-            <a:r>
-              <a:rPr lang="pt-PT" dirty="0" err="1"/>
-              <a:t>edges</a:t>
-            </a:r>
-            <a:r>
-              <a:rPr lang="pt-PT" dirty="0"/>
-              <a:t> </a:t>
-            </a:r>
-            <a:r>
-              <a:rPr lang="pt-PT" dirty="0" err="1"/>
-              <a:t>pf</a:t>
-            </a:r>
-            <a:r>
-              <a:rPr lang="pt-PT" dirty="0"/>
-              <a:t> </a:t>
-            </a:r>
-            <a:r>
-              <a:rPr lang="pt-PT" dirty="0" err="1"/>
-              <a:t>the</a:t>
-            </a:r>
-            <a:r>
-              <a:rPr lang="pt-PT" dirty="0"/>
-              <a:t> </a:t>
-            </a:r>
-            <a:r>
-              <a:rPr lang="pt-PT" dirty="0" err="1"/>
-              <a:t>board</a:t>
-            </a:r>
-            <a:r>
-              <a:rPr lang="pt-PT" dirty="0"/>
-              <a:t>, </a:t>
-            </a:r>
-            <a:r>
-              <a:rPr lang="pt-PT" dirty="0" err="1"/>
-              <a:t>an</a:t>
-            </a:r>
-            <a:r>
-              <a:rPr lang="pt-PT" dirty="0"/>
-              <a:t> </a:t>
-            </a:r>
-            <a:r>
-              <a:rPr lang="pt-PT" dirty="0" err="1"/>
-              <a:t>heuristic</a:t>
-            </a:r>
-            <a:r>
-              <a:rPr lang="pt-PT" dirty="0"/>
-              <a:t> </a:t>
-            </a:r>
-            <a:r>
-              <a:rPr lang="pt-PT" dirty="0" err="1"/>
-              <a:t>function</a:t>
-            </a:r>
-            <a:r>
-              <a:rPr lang="pt-PT" dirty="0"/>
-              <a:t> can </a:t>
-            </a:r>
-            <a:r>
-              <a:rPr lang="pt-PT" dirty="0" err="1"/>
-              <a:t>be</a:t>
-            </a:r>
-            <a:r>
-              <a:rPr lang="pt-PT" dirty="0"/>
-              <a:t> </a:t>
-            </a:r>
-            <a:r>
-              <a:rPr lang="pt-PT" dirty="0" err="1"/>
-              <a:t>defined</a:t>
-            </a:r>
-            <a:r>
-              <a:rPr lang="pt-PT" dirty="0"/>
-              <a:t> as </a:t>
-            </a:r>
-            <a:r>
-              <a:rPr lang="pt-PT" dirty="0" err="1"/>
-              <a:t>the</a:t>
-            </a:r>
-            <a:r>
-              <a:rPr lang="pt-PT" dirty="0"/>
-              <a:t> </a:t>
-            </a:r>
-            <a:r>
-              <a:rPr lang="pt-PT" dirty="0" err="1"/>
-              <a:t>remaining</a:t>
-            </a:r>
-            <a:r>
-              <a:rPr lang="pt-PT" dirty="0"/>
-              <a:t> Manhattan </a:t>
-            </a:r>
-            <a:r>
-              <a:rPr lang="pt-PT" dirty="0" err="1"/>
-              <a:t>distance</a:t>
-            </a:r>
-            <a:r>
-              <a:rPr lang="pt-PT" dirty="0"/>
-              <a:t> </a:t>
-            </a:r>
-            <a:r>
-              <a:rPr lang="pt-PT" dirty="0" err="1"/>
-              <a:t>from</a:t>
-            </a:r>
-            <a:r>
-              <a:rPr lang="pt-PT" dirty="0"/>
-              <a:t> </a:t>
-            </a:r>
-            <a:r>
-              <a:rPr lang="pt-PT" dirty="0" err="1"/>
-              <a:t>the</a:t>
-            </a:r>
-            <a:r>
-              <a:rPr lang="pt-PT" dirty="0"/>
-              <a:t> </a:t>
-            </a:r>
-            <a:r>
-              <a:rPr lang="pt-PT" dirty="0" err="1"/>
-              <a:t>current</a:t>
-            </a:r>
-            <a:r>
-              <a:rPr lang="pt-PT" dirty="0"/>
-              <a:t> </a:t>
-            </a:r>
-            <a:r>
-              <a:rPr lang="pt-PT" dirty="0" err="1"/>
-              <a:t>snake</a:t>
-            </a:r>
-            <a:r>
-              <a:rPr lang="pt-PT" dirty="0"/>
-              <a:t> </a:t>
-            </a:r>
-            <a:r>
-              <a:rPr lang="pt-PT" dirty="0" err="1"/>
-              <a:t>block</a:t>
-            </a:r>
-            <a:r>
-              <a:rPr lang="pt-PT" dirty="0"/>
-              <a:t> to </a:t>
-            </a:r>
-            <a:r>
-              <a:rPr lang="pt-PT" dirty="0" err="1"/>
-              <a:t>the</a:t>
-            </a:r>
-            <a:r>
-              <a:rPr lang="pt-PT" dirty="0"/>
-              <a:t> </a:t>
-            </a:r>
-            <a:r>
-              <a:rPr lang="pt-PT" dirty="0" err="1"/>
-              <a:t>finish</a:t>
-            </a:r>
-            <a:r>
-              <a:rPr lang="pt-PT" dirty="0"/>
-              <a:t> tile.</a:t>
-            </a:r>
-            <a:endParaRPr dirty="0"/>
+              <a:rPr lang="pt-PT" sz="1400" dirty="0"/>
+              <a:t>Heuristic – As the main goal of the puzzle is to find a way to connect the 2 edges pf the board, an heuristic function can be defined as the remaining Manhattan distance from the current snake block to the finish tile, the largest difference between the chess piece with most attacks and the one with least attacks or a combination of both</a:t>
+            </a:r>
+            <a:endParaRPr sz="1400" dirty="0"/>
           </a:p>
         </p:txBody>
       </p:sp>
@@ -8732,11 +7909,17 @@
           <p:cNvGraphicFramePr>
             <a:graphicFrameLocks noGrp="1"/>
           </p:cNvGraphicFramePr>
-          <p:nvPr/>
+          <p:nvPr>
+            <p:extLst>
+              <p:ext uri="{D42A27DB-BD31-4B8C-83A1-F6EECF244321}">
+                <p14:modId xmlns:p14="http://schemas.microsoft.com/office/powerpoint/2010/main" val="1699867129"/>
+              </p:ext>
+            </p:extLst>
+          </p:nvPr>
         </p:nvGraphicFramePr>
         <p:xfrm>
           <a:off x="3119823" y="854138"/>
-          <a:ext cx="8751065" cy="5791200"/>
+          <a:ext cx="8751065" cy="5410200"/>
         </p:xfrm>
         <a:graphic>
           <a:graphicData uri="http://schemas.openxmlformats.org/drawingml/2006/table">
@@ -8859,10 +8042,10 @@
                         <a:defRPr/>
                       </a:pPr>
                       <a:r>
-                        <a:rPr lang="en-GB" sz="1400"/>
+                        <a:rPr lang="en-GB" sz="1100"/>
                         <a:t>Move up</a:t>
                       </a:r>
-                      <a:endParaRPr lang="pt-PT" sz="1400"/>
+                      <a:endParaRPr lang="pt-PT" sz="1100"/>
                     </a:p>
                   </a:txBody>
                   <a:tcPr/>
@@ -8876,20 +8059,20 @@
                         <a:defRPr/>
                       </a:pPr>
                       <a:r>
-                        <a:rPr lang="en-GB" sz="1400" dirty="0"/>
+                        <a:rPr lang="en-GB" sz="1100" dirty="0"/>
                         <a:t>- The above tile of the last piece of the snake is empty ( no chess piece nor snake piece);</a:t>
                       </a:r>
-                      <a:endParaRPr dirty="0"/>
+                      <a:endParaRPr sz="1400" dirty="0"/>
                     </a:p>
                     <a:p>
                       <a:pPr>
                         <a:defRPr/>
                       </a:pPr>
                       <a:r>
-                        <a:rPr lang="en-GB" sz="1400" dirty="0"/>
+                        <a:rPr lang="en-GB" sz="1100" dirty="0"/>
                         <a:t>- The last tile of the snake is not on the top row.</a:t>
                       </a:r>
-                      <a:endParaRPr lang="pt-PT" sz="1400" dirty="0"/>
+                      <a:endParaRPr lang="pt-PT" sz="1100" dirty="0"/>
                     </a:p>
                   </a:txBody>
                   <a:tcPr/>
@@ -8905,10 +8088,10 @@
                         <a:defRPr/>
                       </a:pPr>
                       <a:r>
-                        <a:rPr lang="en-GB" sz="1400"/>
+                        <a:rPr lang="en-GB" sz="1100" dirty="0"/>
                         <a:t>The above tile of the last piece of the snake is now part of the path too;</a:t>
                       </a:r>
-                      <a:endParaRPr/>
+                      <a:endParaRPr sz="1400" dirty="0"/>
                     </a:p>
                     <a:p>
                       <a:pPr marL="285750" indent="-285750">
@@ -8917,10 +8100,43 @@
                         <a:defRPr/>
                       </a:pPr>
                       <a:r>
-                        <a:rPr lang="en-GB" sz="1400"/>
+                        <a:rPr lang="en-GB" sz="1100" dirty="0"/>
                         <a:t>Update matrix’s values. (x, y-1) changes to 1.</a:t>
                       </a:r>
-                      <a:endParaRPr lang="pt-PT" sz="1400"/>
+                    </a:p>
+                    <a:p>
+                      <a:pPr marL="285750" indent="-285750">
+                        <a:buFontTx/>
+                        <a:buChar char="-"/>
+                        <a:defRPr/>
+                      </a:pPr>
+                      <a:r>
+                        <a:rPr lang="en-GB" sz="1100" dirty="0"/>
+                        <a:t>Updates the snake path</a:t>
+                      </a:r>
+                    </a:p>
+                    <a:p>
+                      <a:pPr marL="285750" indent="-285750">
+                        <a:buFontTx/>
+                        <a:buChar char="-"/>
+                        <a:defRPr/>
+                      </a:pPr>
+                      <a:r>
+                        <a:rPr lang="en-GB" sz="1100" dirty="0"/>
+                        <a:t>Cost +=1</a:t>
+                      </a:r>
+                    </a:p>
+                    <a:p>
+                      <a:pPr marL="285750" indent="-285750">
+                        <a:buFontTx/>
+                        <a:buChar char="-"/>
+                        <a:defRPr/>
+                      </a:pPr>
+                      <a:r>
+                        <a:rPr lang="en-GB" sz="1100" dirty="0"/>
+                        <a:t>Current position is now (x,y-1)</a:t>
+                      </a:r>
+                      <a:endParaRPr lang="pt-PT" sz="1100" dirty="0"/>
                     </a:p>
                   </a:txBody>
                   <a:tcPr/>
@@ -8934,10 +8150,10 @@
                         <a:defRPr/>
                       </a:pPr>
                       <a:r>
-                        <a:rPr lang="en-GB" sz="1400"/>
+                        <a:rPr lang="en-GB" sz="1100" dirty="0"/>
                         <a:t>1</a:t>
                       </a:r>
-                      <a:endParaRPr lang="pt-PT" sz="1400"/>
+                      <a:endParaRPr lang="pt-PT" sz="1100" dirty="0"/>
                     </a:p>
                   </a:txBody>
                   <a:tcPr/>
@@ -8971,16 +8187,16 @@
                         <a:defRPr/>
                       </a:pPr>
                       <a:r>
-                        <a:rPr lang="en-GB" sz="1400"/>
+                        <a:rPr lang="en-GB" sz="1100"/>
                         <a:t>Move Down</a:t>
                       </a:r>
-                      <a:endParaRPr lang="pt-PT" sz="1400"/>
+                      <a:endParaRPr lang="pt-PT" sz="1100"/>
                     </a:p>
                     <a:p>
                       <a:pPr algn="ctr">
                         <a:defRPr/>
                       </a:pPr>
-                      <a:endParaRPr lang="pt-PT" sz="1400"/>
+                      <a:endParaRPr lang="pt-PT" sz="1100"/>
                     </a:p>
                   </a:txBody>
                   <a:tcPr/>
@@ -8994,20 +8210,20 @@
                         <a:defRPr/>
                       </a:pPr>
                       <a:r>
-                        <a:rPr lang="en-GB" sz="1400"/>
+                        <a:rPr lang="en-GB" sz="1100"/>
                         <a:t>- The tile on the bottom of the last piece of the snake is empty (no chess piece nor snake piece);</a:t>
                       </a:r>
-                      <a:endParaRPr/>
+                      <a:endParaRPr sz="1400"/>
                     </a:p>
                     <a:p>
                       <a:pPr>
                         <a:defRPr/>
                       </a:pPr>
                       <a:r>
-                        <a:rPr lang="en-GB" sz="1400"/>
+                        <a:rPr lang="en-GB" sz="1100"/>
                         <a:t>- The last tile of the snake is not on the last row.</a:t>
                       </a:r>
-                      <a:endParaRPr lang="pt-PT" sz="1400"/>
+                      <a:endParaRPr lang="pt-PT" sz="1100"/>
                     </a:p>
                   </a:txBody>
                   <a:tcPr/>
@@ -9034,10 +8250,10 @@
                         <a:defRPr/>
                       </a:pPr>
                       <a:r>
-                        <a:rPr lang="en-GB" sz="1400"/>
+                        <a:rPr lang="en-GB" sz="1100" dirty="0"/>
                         <a:t>The tile on the bottom of the last piece of the snake is now part of the path too;</a:t>
                       </a:r>
-                      <a:endParaRPr/>
+                      <a:endParaRPr sz="1400" dirty="0"/>
                     </a:p>
                     <a:p>
                       <a:pPr marL="285750" marR="0" lvl="0" indent="-285750" algn="l" defTabSz="914400">
@@ -9057,35 +8273,43 @@
                         <a:defRPr/>
                       </a:pPr>
                       <a:r>
-                        <a:rPr lang="en-GB" sz="1400"/>
+                        <a:rPr lang="en-GB" sz="1100" dirty="0"/>
                         <a:t>Update matrix’s values. (x, y+1) changes to 1.</a:t>
                       </a:r>
-                      <a:endParaRPr lang="pt-PT" sz="1400"/>
                     </a:p>
                     <a:p>
-                      <a:pPr marL="285750" marR="0" lvl="0" indent="-285750" algn="l" defTabSz="914400">
-                        <a:lnSpc>
-                          <a:spcPct val="100000"/>
-                        </a:lnSpc>
-                        <a:spcBef>
-                          <a:spcPts val="0"/>
-                        </a:spcBef>
-                        <a:spcAft>
-                          <a:spcPts val="0"/>
-                        </a:spcAft>
-                        <a:buClrTx/>
-                        <a:buSzTx/>
+                      <a:pPr marL="285750" indent="-285750">
                         <a:buFontTx/>
                         <a:buChar char="-"/>
                         <a:defRPr/>
                       </a:pPr>
-                      <a:endParaRPr lang="pt-PT" sz="1400"/>
+                      <a:r>
+                        <a:rPr lang="en-GB" sz="1100" dirty="0"/>
+                        <a:t>Updates the snake path</a:t>
+                      </a:r>
                     </a:p>
                     <a:p>
-                      <a:pPr>
+                      <a:pPr marL="285750" indent="-285750">
+                        <a:buFontTx/>
+                        <a:buChar char="-"/>
                         <a:defRPr/>
                       </a:pPr>
-                      <a:endParaRPr lang="pt-PT" sz="1400"/>
+                      <a:r>
+                        <a:rPr lang="en-GB" sz="1100" dirty="0"/>
+                        <a:t>Cost +=1</a:t>
+                      </a:r>
+                    </a:p>
+                    <a:p>
+                      <a:pPr marL="285750" indent="-285750">
+                        <a:buFontTx/>
+                        <a:buChar char="-"/>
+                        <a:defRPr/>
+                      </a:pPr>
+                      <a:r>
+                        <a:rPr lang="en-GB" sz="1100" dirty="0"/>
+                        <a:t>Current position is now (x,y-1)</a:t>
+                      </a:r>
+                      <a:endParaRPr lang="pt-PT" sz="1100" dirty="0"/>
                     </a:p>
                   </a:txBody>
                   <a:tcPr/>
@@ -9099,10 +8323,10 @@
                         <a:defRPr/>
                       </a:pPr>
                       <a:r>
-                        <a:rPr lang="en-GB" sz="1400"/>
+                        <a:rPr lang="en-GB" sz="1100"/>
                         <a:t>1</a:t>
                       </a:r>
-                      <a:endParaRPr lang="pt-PT" sz="1400"/>
+                      <a:endParaRPr lang="pt-PT" sz="1100"/>
                     </a:p>
                   </a:txBody>
                   <a:tcPr/>
@@ -9136,16 +8360,16 @@
                         <a:defRPr/>
                       </a:pPr>
                       <a:r>
-                        <a:rPr lang="en-GB" sz="1400"/>
+                        <a:rPr lang="en-GB" sz="1100"/>
                         <a:t>Move Left</a:t>
                       </a:r>
-                      <a:endParaRPr lang="pt-PT" sz="1400"/>
+                      <a:endParaRPr lang="pt-PT" sz="1100"/>
                     </a:p>
                     <a:p>
                       <a:pPr algn="ctr">
                         <a:defRPr/>
                       </a:pPr>
-                      <a:endParaRPr lang="pt-PT" sz="1400"/>
+                      <a:endParaRPr lang="pt-PT" sz="1100"/>
                     </a:p>
                   </a:txBody>
                   <a:tcPr/>
@@ -9159,20 +8383,20 @@
                         <a:defRPr/>
                       </a:pPr>
                       <a:r>
-                        <a:rPr lang="en-GB" sz="1400"/>
+                        <a:rPr lang="en-GB" sz="1100"/>
                         <a:t>- The tile on the left of the last piece of the snake is empty ( no chess piece nor snake piece);</a:t>
                       </a:r>
-                      <a:endParaRPr/>
+                      <a:endParaRPr sz="1400"/>
                     </a:p>
                     <a:p>
                       <a:pPr>
                         <a:defRPr/>
                       </a:pPr>
                       <a:r>
-                        <a:rPr lang="en-GB" sz="1400"/>
+                        <a:rPr lang="en-GB" sz="1100"/>
                         <a:t>- The last tile of the snake is not on the first column.</a:t>
                       </a:r>
-                      <a:endParaRPr lang="pt-PT" sz="1400"/>
+                      <a:endParaRPr lang="pt-PT" sz="1100"/>
                     </a:p>
                   </a:txBody>
                   <a:tcPr/>
@@ -9199,52 +8423,55 @@
                         <a:defRPr/>
                       </a:pPr>
                       <a:r>
-                        <a:rPr lang="en-GB" sz="1400"/>
+                        <a:rPr lang="en-GB" sz="1100" dirty="0"/>
                         <a:t>The tile on the left of the snake is now part of the path too;</a:t>
                       </a:r>
-                      <a:endParaRPr/>
+                      <a:endParaRPr sz="1400" dirty="0"/>
                     </a:p>
                     <a:p>
-                      <a:pPr marL="285750" marR="0" lvl="0" indent="-285750" algn="l" defTabSz="914400">
-                        <a:lnSpc>
-                          <a:spcPct val="100000"/>
-                        </a:lnSpc>
-                        <a:spcBef>
-                          <a:spcPts val="0"/>
-                        </a:spcBef>
-                        <a:spcAft>
-                          <a:spcPts val="0"/>
-                        </a:spcAft>
-                        <a:buClrTx/>
-                        <a:buSzTx/>
+                      <a:pPr marL="285750" indent="-285750">
                         <a:buFontTx/>
                         <a:buChar char="-"/>
                         <a:defRPr/>
                       </a:pPr>
                       <a:r>
-                        <a:rPr lang="en-GB" sz="1400"/>
-                        <a:t>Update matrix’s values. (x-1, y) changes to 1.</a:t>
+                        <a:rPr lang="en-GB" sz="1100" dirty="0"/>
+                        <a:t>Update matrix’s values. (x-1, y) changes to 1. </a:t>
                       </a:r>
-                      <a:endParaRPr lang="pt-PT" sz="1400"/>
                     </a:p>
                     <a:p>
-                      <a:pPr marL="285750" marR="0" lvl="0" indent="-285750" algn="l" defTabSz="914400">
-                        <a:lnSpc>
-                          <a:spcPct val="100000"/>
-                        </a:lnSpc>
-                        <a:spcBef>
-                          <a:spcPts val="0"/>
-                        </a:spcBef>
-                        <a:spcAft>
-                          <a:spcPts val="0"/>
-                        </a:spcAft>
-                        <a:buClrTx/>
-                        <a:buSzTx/>
+                      <a:pPr marL="285750" indent="-285750">
                         <a:buFontTx/>
                         <a:buChar char="-"/>
                         <a:defRPr/>
                       </a:pPr>
-                      <a:endParaRPr lang="pt-PT" sz="1400"/>
+                      <a:r>
+                        <a:rPr lang="en-GB" sz="1100" dirty="0"/>
+                        <a:t>Updates the snake path</a:t>
+                      </a:r>
+                    </a:p>
+                    <a:p>
+                      <a:pPr marL="285750" indent="-285750">
+                        <a:buFontTx/>
+                        <a:buChar char="-"/>
+                        <a:defRPr/>
+                      </a:pPr>
+                      <a:r>
+                        <a:rPr lang="en-GB" sz="1100" dirty="0"/>
+                        <a:t>Cost +=1</a:t>
+                      </a:r>
+                    </a:p>
+                    <a:p>
+                      <a:pPr marL="285750" indent="-285750">
+                        <a:buFontTx/>
+                        <a:buChar char="-"/>
+                        <a:defRPr/>
+                      </a:pPr>
+                      <a:r>
+                        <a:rPr lang="en-GB" sz="1100" dirty="0"/>
+                        <a:t>Current position is now (x,y-1)</a:t>
+                      </a:r>
+                      <a:endParaRPr lang="pt-PT" sz="1100" dirty="0"/>
                     </a:p>
                   </a:txBody>
                   <a:tcPr/>
@@ -9271,10 +8498,10 @@
                         <a:defRPr/>
                       </a:pPr>
                       <a:r>
-                        <a:rPr lang="en-GB" sz="1400"/>
+                        <a:rPr lang="en-GB" sz="1100"/>
                         <a:t>1</a:t>
                       </a:r>
-                      <a:endParaRPr lang="pt-PT" sz="1400"/>
+                      <a:endParaRPr lang="pt-PT" sz="1100"/>
                     </a:p>
                   </a:txBody>
                   <a:tcPr/>
@@ -9308,16 +8535,16 @@
                         <a:defRPr/>
                       </a:pPr>
                       <a:r>
-                        <a:rPr lang="en-GB" sz="1400"/>
+                        <a:rPr lang="en-GB" sz="1100"/>
                         <a:t>Move Right</a:t>
                       </a:r>
-                      <a:endParaRPr lang="pt-PT" sz="1400"/>
+                      <a:endParaRPr lang="pt-PT" sz="1100"/>
                     </a:p>
                     <a:p>
                       <a:pPr algn="ctr">
                         <a:defRPr/>
                       </a:pPr>
-                      <a:endParaRPr lang="pt-PT" sz="1400"/>
+                      <a:endParaRPr lang="pt-PT" sz="1100"/>
                     </a:p>
                   </a:txBody>
                   <a:tcPr/>
@@ -9331,20 +8558,20 @@
                         <a:defRPr/>
                       </a:pPr>
                       <a:r>
-                        <a:rPr lang="en-GB" sz="1400"/>
+                        <a:rPr lang="en-GB" sz="1100"/>
                         <a:t>- The tile on the right of the last piece of the snake is empty ( no chess piece nor snake piece);</a:t>
                       </a:r>
-                      <a:endParaRPr/>
+                      <a:endParaRPr sz="1400"/>
                     </a:p>
                     <a:p>
                       <a:pPr>
                         <a:defRPr/>
                       </a:pPr>
                       <a:r>
-                        <a:rPr lang="en-GB" sz="1400"/>
+                        <a:rPr lang="en-GB" sz="1100"/>
                         <a:t>- The last tile of the snake is not on the last column.</a:t>
                       </a:r>
-                      <a:endParaRPr lang="pt-PT" sz="1400"/>
+                      <a:endParaRPr lang="pt-PT" sz="1100"/>
                     </a:p>
                   </a:txBody>
                   <a:tcPr/>
@@ -9371,10 +8598,10 @@
                         <a:defRPr/>
                       </a:pPr>
                       <a:r>
-                        <a:rPr lang="en-GB" sz="1400"/>
-                        <a:t>The tile on the right of the snake is now part of the path too;</a:t>
+                        <a:rPr lang="en-GB" sz="1100" dirty="0"/>
+                        <a:t>- The tile on the right of the snake is now part of the path too;</a:t>
                       </a:r>
-                      <a:endParaRPr/>
+                      <a:endParaRPr sz="1400" dirty="0"/>
                     </a:p>
                     <a:p>
                       <a:pPr marL="0" marR="0" lvl="0" indent="0" algn="l" defTabSz="914400">
@@ -9394,35 +8621,43 @@
                         <a:defRPr/>
                       </a:pPr>
                       <a:r>
-                        <a:rPr lang="en-GB" sz="1400"/>
-                        <a:t>Update matrix’s values. (x+1, y) changes to 1.</a:t>
+                        <a:rPr lang="en-GB" sz="1100" dirty="0"/>
+                        <a:t>- Update matrix’s values. (x+1, y) changes to 1.</a:t>
                       </a:r>
-                      <a:endParaRPr lang="pt-PT" sz="1400"/>
                     </a:p>
                     <a:p>
-                      <a:pPr marL="0" marR="0" lvl="0" indent="0" algn="l" defTabSz="914400">
-                        <a:lnSpc>
-                          <a:spcPct val="100000"/>
-                        </a:lnSpc>
-                        <a:spcBef>
-                          <a:spcPts val="0"/>
-                        </a:spcBef>
-                        <a:spcAft>
-                          <a:spcPts val="0"/>
-                        </a:spcAft>
-                        <a:buClrTx/>
-                        <a:buSzTx/>
+                      <a:pPr marL="285750" indent="-285750">
                         <a:buFontTx/>
-                        <a:buNone/>
+                        <a:buChar char="-"/>
                         <a:defRPr/>
                       </a:pPr>
-                      <a:endParaRPr lang="pt-PT" sz="1400"/>
+                      <a:r>
+                        <a:rPr lang="en-GB" sz="1100" dirty="0"/>
+                        <a:t>Updates the snake path</a:t>
+                      </a:r>
                     </a:p>
                     <a:p>
-                      <a:pPr>
+                      <a:pPr marL="285750" indent="-285750">
+                        <a:buFontTx/>
+                        <a:buChar char="-"/>
                         <a:defRPr/>
                       </a:pPr>
-                      <a:endParaRPr lang="pt-PT" sz="1400"/>
+                      <a:r>
+                        <a:rPr lang="en-GB" sz="1100" dirty="0"/>
+                        <a:t>Cost +=1</a:t>
+                      </a:r>
+                    </a:p>
+                    <a:p>
+                      <a:pPr marL="285750" indent="-285750">
+                        <a:buFontTx/>
+                        <a:buChar char="-"/>
+                        <a:defRPr/>
+                      </a:pPr>
+                      <a:r>
+                        <a:rPr lang="en-GB" sz="1100" dirty="0"/>
+                        <a:t>Current position is now (x,y-1)</a:t>
+                      </a:r>
+                      <a:endParaRPr lang="pt-PT" sz="1100" dirty="0"/>
                     </a:p>
                   </a:txBody>
                   <a:tcPr/>
@@ -9436,10 +8671,10 @@
                         <a:defRPr/>
                       </a:pPr>
                       <a:r>
-                        <a:rPr lang="en-GB" sz="1400" dirty="0"/>
+                        <a:rPr lang="en-GB" sz="1100" dirty="0"/>
                         <a:t>1</a:t>
                       </a:r>
-                      <a:endParaRPr lang="pt-PT" sz="1400" dirty="0"/>
+                      <a:endParaRPr lang="pt-PT" sz="1100" dirty="0"/>
                     </a:p>
                   </a:txBody>
                   <a:tcPr/>
@@ -9550,7 +8785,7 @@
         <p:spPr bwMode="auto"/>
         <p:txBody>
           <a:bodyPr>
-            <a:normAutofit fontScale="92500" lnSpcReduction="10000"/>
+            <a:normAutofit fontScale="70000" lnSpcReduction="20000"/>
           </a:bodyPr>
           <a:lstStyle/>
           <a:p>
@@ -9558,46 +8793,146 @@
               <a:defRPr/>
             </a:pPr>
             <a:r>
-              <a:rPr lang="pt-PT"/>
+              <a:rPr lang="pt-PT" dirty="0"/>
               <a:t>Prefered Languages: Python.</a:t>
             </a:r>
-            <a:endParaRPr/>
+            <a:endParaRPr dirty="0"/>
           </a:p>
           <a:p>
             <a:pPr>
               <a:defRPr/>
             </a:pPr>
             <a:r>
-              <a:rPr lang="pt-PT"/>
-              <a:t>Data structures: board ( class that will represent the game state) and piece (a class which defines the possible attacks of the chess piece and stores its position).</a:t>
-            </a:r>
-            <a:endParaRPr/>
+              <a:rPr lang="pt-PT" dirty="0"/>
+              <a:t>Data structures: </a:t>
+            </a:r>
+            <a:r>
+              <a:rPr lang="pt-PT" b="1" dirty="0"/>
+              <a:t>astar</a:t>
+            </a:r>
+            <a:r>
+              <a:rPr lang="pt-PT" dirty="0"/>
+              <a:t> (</a:t>
+            </a:r>
+            <a:r>
+              <a:rPr lang="en-US" dirty="0"/>
+              <a:t>A class used to implement a-star algorithm</a:t>
+            </a:r>
+            <a:r>
+              <a:rPr lang="pt-PT" dirty="0"/>
+              <a:t>), </a:t>
+            </a:r>
+            <a:r>
+              <a:rPr lang="pt-PT" b="1" dirty="0"/>
+              <a:t>board</a:t>
+            </a:r>
+            <a:r>
+              <a:rPr lang="pt-PT" dirty="0"/>
+              <a:t> (</a:t>
+            </a:r>
+            <a:r>
+              <a:rPr lang="en-US" dirty="0"/>
+              <a:t>A class used to implement the game logic and its status), </a:t>
+            </a:r>
+            <a:r>
+              <a:rPr lang="en-US" b="1" dirty="0" err="1"/>
+              <a:t>dfs</a:t>
+            </a:r>
+            <a:r>
+              <a:rPr lang="en-US" dirty="0"/>
+              <a:t> (A class used to implement the </a:t>
+            </a:r>
+            <a:r>
+              <a:rPr lang="en-US" dirty="0" err="1"/>
+              <a:t>dfs</a:t>
+            </a:r>
+            <a:r>
+              <a:rPr lang="en-US" dirty="0"/>
+              <a:t> algorithm), </a:t>
+            </a:r>
+            <a:r>
+              <a:rPr lang="en-US" b="1" dirty="0"/>
+              <a:t>display</a:t>
+            </a:r>
+            <a:r>
+              <a:rPr lang="en-US" dirty="0"/>
+              <a:t> (A class used to implement graphic interface using </a:t>
+            </a:r>
+            <a:r>
+              <a:rPr lang="en-US" dirty="0" err="1"/>
+              <a:t>pygame</a:t>
+            </a:r>
+            <a:r>
+              <a:rPr lang="en-US" dirty="0"/>
+              <a:t>), </a:t>
+            </a:r>
+            <a:r>
+              <a:rPr lang="en-US" b="1" dirty="0"/>
+              <a:t>greedy</a:t>
+            </a:r>
+            <a:r>
+              <a:rPr lang="en-US" dirty="0"/>
+              <a:t> (A class used to implement Greedy algorithm), </a:t>
+            </a:r>
+            <a:r>
+              <a:rPr lang="en-US" b="1" dirty="0"/>
+              <a:t>menu</a:t>
+            </a:r>
+            <a:r>
+              <a:rPr lang="en-US" dirty="0"/>
+              <a:t> (A class used to implement the menu in the terminal), </a:t>
+            </a:r>
+            <a:r>
+              <a:rPr lang="en-US" b="1" dirty="0"/>
+              <a:t>pieces</a:t>
+            </a:r>
+            <a:r>
+              <a:rPr lang="en-US" dirty="0"/>
+              <a:t> (A class used to represent the chess piece), </a:t>
+            </a:r>
+            <a:r>
+              <a:rPr lang="en-US" b="1" dirty="0"/>
+              <a:t>snake</a:t>
+            </a:r>
+            <a:r>
+              <a:rPr lang="en-US" dirty="0"/>
+              <a:t> (A class used to represent the snake/path) and </a:t>
+            </a:r>
+            <a:r>
+              <a:rPr lang="en-US" b="1" dirty="0"/>
+              <a:t>state</a:t>
+            </a:r>
+            <a:r>
+              <a:rPr lang="en-US" dirty="0"/>
+              <a:t> (A class used to represent a game state for algorithms).</a:t>
+            </a:r>
+            <a:endParaRPr lang="pt-PT" dirty="0"/>
           </a:p>
           <a:p>
             <a:pPr>
               <a:defRPr/>
             </a:pPr>
             <a:r>
-              <a:rPr lang="pt-PT"/>
+              <a:rPr lang="pt-PT" dirty="0"/>
               <a:t>The initial state is defined by reading the saved text files with board information.</a:t>
             </a:r>
-            <a:endParaRPr/>
+            <a:endParaRPr dirty="0"/>
           </a:p>
           <a:p>
             <a:pPr>
               <a:defRPr/>
             </a:pPr>
             <a:r>
-              <a:rPr lang="pt-PT"/>
+              <a:rPr lang="pt-PT" dirty="0"/>
               <a:t>Implemented libraries: numpy, pygame</a:t>
             </a:r>
-            <a:endParaRPr/>
+            <a:endParaRPr dirty="0"/>
           </a:p>
           <a:p>
             <a:pPr>
               <a:defRPr/>
             </a:pPr>
-            <a:endParaRPr lang="pt-PT"/>
+            <a:endParaRPr lang="pt-PT" dirty="0"/>
           </a:p>
         </p:txBody>
       </p:sp>
@@ -9674,21 +9009,42 @@
         <p:spPr/>
         <p:txBody>
           <a:bodyPr>
-            <a:normAutofit fontScale="55000" lnSpcReduction="20000"/>
+            <a:normAutofit fontScale="47500" lnSpcReduction="20000"/>
           </a:bodyPr>
           <a:lstStyle/>
           <a:p>
             <a:r>
+              <a:rPr lang="pt-PT" dirty="0"/>
+              <a:t>The game allows two possible interactions between user and machine. </a:t>
+            </a:r>
+            <a:r>
+              <a:rPr lang="pt-PT" b="1" dirty="0"/>
+              <a:t>First</a:t>
+            </a:r>
+            <a:r>
+              <a:rPr lang="pt-PT" dirty="0"/>
+              <a:t>, we developed a single player mode, where the user can create his own path and then check if it is correct or not based on the game’s rules;</a:t>
+            </a:r>
+          </a:p>
+          <a:p>
+            <a:r>
+              <a:rPr lang="pt-PT" b="1" dirty="0"/>
+              <a:t>Then</a:t>
+            </a:r>
+            <a:r>
+              <a:rPr lang="pt-PT" dirty="0"/>
+              <a:t>, we created an AI mode, that based on chosen level, generates a correct answer, using many algorithms such as:</a:t>
+            </a:r>
+          </a:p>
+          <a:p>
+            <a:pPr lvl="1"/>
+            <a:r>
+              <a:rPr lang="pt-PT" dirty="0"/>
+              <a:t>DFS, </a:t>
+            </a:r>
+            <a:r>
               <a:rPr lang="pt-PT" dirty="0" err="1"/>
-              <a:t>The</a:t>
-            </a:r>
-            <a:r>
-              <a:rPr lang="pt-PT" dirty="0"/>
-              <a:t> game </a:t>
-            </a:r>
-            <a:r>
-              <a:rPr lang="pt-PT" dirty="0" err="1"/>
-              <a:t>allows</a:t>
+              <a:t>Greedy</a:t>
             </a:r>
             <a:r>
               <a:rPr lang="pt-PT" dirty="0"/>
@@ -9696,7 +9052,7 @@
             </a:r>
             <a:r>
               <a:rPr lang="pt-PT" dirty="0" err="1"/>
-              <a:t>two</a:t>
+              <a:t>and</a:t>
             </a:r>
             <a:r>
               <a:rPr lang="pt-PT" dirty="0"/>
@@ -9704,7 +9060,15 @@
             </a:r>
             <a:r>
               <a:rPr lang="pt-PT" dirty="0" err="1"/>
-              <a:t>possible</a:t>
+              <a:t>A-Star</a:t>
+            </a:r>
+            <a:r>
+              <a:rPr lang="pt-PT" dirty="0"/>
+              <a:t> (</a:t>
+            </a:r>
+            <a:r>
+              <a:rPr lang="pt-PT" dirty="0" err="1"/>
+              <a:t>these</a:t>
             </a:r>
             <a:r>
               <a:rPr lang="pt-PT" dirty="0"/>
@@ -9712,7 +9076,23 @@
             </a:r>
             <a:r>
               <a:rPr lang="pt-PT" dirty="0" err="1"/>
-              <a:t>interatctions</a:t>
+              <a:t>last</a:t>
+            </a:r>
+            <a:r>
+              <a:rPr lang="pt-PT" dirty="0"/>
+              <a:t> 2 </a:t>
+            </a:r>
+            <a:r>
+              <a:rPr lang="pt-PT" dirty="0" err="1"/>
+              <a:t>featuring</a:t>
+            </a:r>
+            <a:r>
+              <a:rPr lang="pt-PT" dirty="0"/>
+              <a:t> 3 </a:t>
+            </a:r>
+            <a:r>
+              <a:rPr lang="pt-PT" dirty="0" err="1"/>
+              <a:t>distinct</a:t>
             </a:r>
             <a:r>
               <a:rPr lang="pt-PT" dirty="0"/>
@@ -9720,7 +9100,15 @@
             </a:r>
             <a:r>
               <a:rPr lang="pt-PT" dirty="0" err="1"/>
-              <a:t>between</a:t>
+              <a:t>heuristics</a:t>
+            </a:r>
+            <a:r>
+              <a:rPr lang="pt-PT" dirty="0"/>
+              <a:t>) to </a:t>
+            </a:r>
+            <a:r>
+              <a:rPr lang="pt-PT" dirty="0" err="1"/>
+              <a:t>calculate</a:t>
             </a:r>
             <a:r>
               <a:rPr lang="pt-PT" dirty="0"/>
@@ -9728,7 +9116,7 @@
             </a:r>
             <a:r>
               <a:rPr lang="pt-PT" dirty="0" err="1"/>
-              <a:t>user</a:t>
+              <a:t>the</a:t>
             </a:r>
             <a:r>
               <a:rPr lang="pt-PT" dirty="0"/>
@@ -9736,7 +9124,7 @@
             </a:r>
             <a:r>
               <a:rPr lang="pt-PT" dirty="0" err="1"/>
-              <a:t>and</a:t>
+              <a:t>best</a:t>
             </a:r>
             <a:r>
               <a:rPr lang="pt-PT" dirty="0"/>
@@ -9744,23 +9132,7 @@
             </a:r>
             <a:r>
               <a:rPr lang="pt-PT" dirty="0" err="1"/>
-              <a:t>machine</a:t>
-            </a:r>
-            <a:r>
-              <a:rPr lang="pt-PT" dirty="0"/>
-              <a:t>. </a:t>
-            </a:r>
-            <a:r>
-              <a:rPr lang="pt-PT" b="1" dirty="0" err="1"/>
-              <a:t>First</a:t>
-            </a:r>
-            <a:r>
-              <a:rPr lang="pt-PT" dirty="0"/>
-              <a:t>, </a:t>
-            </a:r>
-            <a:r>
-              <a:rPr lang="pt-PT" dirty="0" err="1"/>
-              <a:t>we</a:t>
+              <a:t>path</a:t>
             </a:r>
             <a:r>
               <a:rPr lang="pt-PT" dirty="0"/>
@@ -9768,15 +9140,7 @@
             </a:r>
             <a:r>
               <a:rPr lang="pt-PT" dirty="0" err="1"/>
-              <a:t>developed</a:t>
-            </a:r>
-            <a:r>
-              <a:rPr lang="pt-PT" dirty="0"/>
-              <a:t> a single </a:t>
-            </a:r>
-            <a:r>
-              <a:rPr lang="pt-PT" dirty="0" err="1"/>
-              <a:t>player</a:t>
+              <a:t>from</a:t>
             </a:r>
             <a:r>
               <a:rPr lang="pt-PT" dirty="0"/>
@@ -9784,15 +9148,15 @@
             </a:r>
             <a:r>
               <a:rPr lang="pt-PT" dirty="0" err="1"/>
-              <a:t>mode</a:t>
+              <a:t>Start</a:t>
             </a:r>
             <a:r>
               <a:rPr lang="pt-PT" dirty="0"/>
-              <a:t>, </a:t>
+              <a:t> Tile to Final Tile. </a:t>
             </a:r>
             <a:r>
               <a:rPr lang="pt-PT" dirty="0" err="1"/>
-              <a:t>where</a:t>
+              <a:t>Each</a:t>
             </a:r>
             <a:r>
               <a:rPr lang="pt-PT" dirty="0"/>
@@ -9800,7 +9164,7 @@
             </a:r>
             <a:r>
               <a:rPr lang="pt-PT" dirty="0" err="1"/>
-              <a:t>the</a:t>
+              <a:t>one</a:t>
             </a:r>
             <a:r>
               <a:rPr lang="pt-PT" dirty="0"/>
@@ -9808,15 +9172,23 @@
             </a:r>
             <a:r>
               <a:rPr lang="pt-PT" dirty="0" err="1"/>
-              <a:t>user</a:t>
+              <a:t>had</a:t>
             </a:r>
             <a:r>
               <a:rPr lang="pt-PT" dirty="0"/>
-              <a:t> can </a:t>
+              <a:t> a </a:t>
             </a:r>
             <a:r>
               <a:rPr lang="pt-PT" dirty="0" err="1"/>
-              <a:t>create</a:t>
+              <a:t>different</a:t>
+            </a:r>
+            <a:r>
+              <a:rPr lang="pt-PT" dirty="0"/>
+              <a:t> performance </a:t>
+            </a:r>
+            <a:r>
+              <a:rPr lang="pt-PT" dirty="0" err="1"/>
+              <a:t>that</a:t>
             </a:r>
             <a:r>
               <a:rPr lang="pt-PT" dirty="0"/>
@@ -9824,7 +9196,7 @@
             </a:r>
             <a:r>
               <a:rPr lang="pt-PT" dirty="0" err="1"/>
-              <a:t>his</a:t>
+              <a:t>will</a:t>
             </a:r>
             <a:r>
               <a:rPr lang="pt-PT" dirty="0"/>
@@ -9832,7 +9204,7 @@
             </a:r>
             <a:r>
               <a:rPr lang="pt-PT" dirty="0" err="1"/>
-              <a:t>own</a:t>
+              <a:t>be</a:t>
             </a:r>
             <a:r>
               <a:rPr lang="pt-PT" dirty="0"/>
@@ -9840,902 +9212,87 @@
             </a:r>
             <a:r>
               <a:rPr lang="pt-PT" dirty="0" err="1"/>
-              <a:t>path</a:t>
-            </a:r>
+              <a:t>analyzed</a:t>
+            </a:r>
+            <a:r>
+              <a:rPr lang="pt-PT" dirty="0"/>
+              <a:t> later.</a:t>
+            </a:r>
+          </a:p>
+          <a:p>
             <a:r>
               <a:rPr lang="pt-PT" dirty="0"/>
               <a:t> </a:t>
             </a:r>
             <a:r>
-              <a:rPr lang="pt-PT" dirty="0" err="1"/>
-              <a:t>and</a:t>
+              <a:rPr lang="pt-PT" b="1" dirty="0"/>
+              <a:t>Evaluation Function</a:t>
             </a:r>
             <a:r>
               <a:rPr lang="pt-PT" dirty="0"/>
-              <a:t> </a:t>
-            </a:r>
-            <a:r>
-              <a:rPr lang="pt-PT" dirty="0" err="1"/>
-              <a:t>then</a:t>
+              <a:t>: The path created from the start until the of end file should respect the rules such as the non existance of collisions between snake blocks, chess pieces may not be crossed by the path ( both evaluated in the course of the search) and each chess piece attacks an equal number of squares of the choose path (calculated when the end tile is reached; if ok returns otherwise continues the search);</a:t>
+            </a:r>
+          </a:p>
+          <a:p>
+            <a:r>
+              <a:rPr lang="pt-PT" b="1" dirty="0"/>
+              <a:t>Heuristics</a:t>
             </a:r>
             <a:r>
               <a:rPr lang="pt-PT" dirty="0"/>
-              <a:t> </a:t>
-            </a:r>
-            <a:r>
-              <a:rPr lang="pt-PT" dirty="0" err="1"/>
-              <a:t>check</a:t>
-            </a:r>
+              <a:t>: For the AI mode, heuristics were important for implementing A-star and Greedy Algorithms and to generate the solution more efficiently:</a:t>
+            </a:r>
+          </a:p>
+          <a:p>
+            <a:pPr lvl="1"/>
             <a:r>
               <a:rPr lang="pt-PT" dirty="0"/>
-              <a:t> </a:t>
-            </a:r>
-            <a:r>
-              <a:rPr lang="pt-PT" dirty="0" err="1"/>
-              <a:t>if</a:t>
-            </a:r>
+              <a:t>Heuristic 1: Manhattan Distance;</a:t>
+            </a:r>
+          </a:p>
+          <a:p>
+            <a:pPr lvl="1"/>
             <a:r>
               <a:rPr lang="pt-PT" dirty="0"/>
-              <a:t> </a:t>
-            </a:r>
-            <a:r>
-              <a:rPr lang="pt-PT" dirty="0" err="1"/>
-              <a:t>it</a:t>
-            </a:r>
+              <a:t>Heuristic 2: </a:t>
+            </a:r>
+            <a:r>
+              <a:rPr lang="en-US" dirty="0">
+                <a:solidFill>
+                  <a:srgbClr val="D4D4D4"/>
+                </a:solidFill>
+                <a:effectLst/>
+              </a:rPr>
+              <a:t>Maximum Chess Piece Attacks Difference ( we want the attacks to be as close as possible )</a:t>
+            </a:r>
+          </a:p>
+          <a:p>
+            <a:pPr lvl="1"/>
             <a:r>
               <a:rPr lang="pt-PT" dirty="0"/>
-              <a:t> </a:t>
-            </a:r>
-            <a:r>
-              <a:rPr lang="pt-PT" dirty="0" err="1"/>
-              <a:t>is</a:t>
-            </a:r>
-            <a:r>
-              <a:rPr lang="pt-PT" dirty="0"/>
-              <a:t> </a:t>
-            </a:r>
-            <a:r>
-              <a:rPr lang="pt-PT" dirty="0" err="1"/>
-              <a:t>correct</a:t>
-            </a:r>
-            <a:r>
-              <a:rPr lang="pt-PT" dirty="0"/>
-              <a:t> </a:t>
-            </a:r>
-            <a:r>
-              <a:rPr lang="pt-PT" dirty="0" err="1"/>
-              <a:t>or</a:t>
-            </a:r>
-            <a:r>
-              <a:rPr lang="pt-PT" dirty="0"/>
-              <a:t> </a:t>
-            </a:r>
-            <a:r>
-              <a:rPr lang="pt-PT" dirty="0" err="1"/>
-              <a:t>not</a:t>
-            </a:r>
-            <a:r>
-              <a:rPr lang="pt-PT" dirty="0"/>
-              <a:t> </a:t>
-            </a:r>
-            <a:r>
-              <a:rPr lang="pt-PT" dirty="0" err="1"/>
-              <a:t>based</a:t>
-            </a:r>
-            <a:r>
-              <a:rPr lang="pt-PT" dirty="0"/>
-              <a:t> </a:t>
-            </a:r>
-            <a:r>
-              <a:rPr lang="pt-PT" dirty="0" err="1"/>
-              <a:t>on</a:t>
-            </a:r>
-            <a:r>
-              <a:rPr lang="pt-PT" dirty="0"/>
-              <a:t> </a:t>
-            </a:r>
-            <a:r>
-              <a:rPr lang="pt-PT" dirty="0" err="1"/>
-              <a:t>the</a:t>
-            </a:r>
-            <a:r>
-              <a:rPr lang="pt-PT" dirty="0"/>
-              <a:t> </a:t>
-            </a:r>
-            <a:r>
-              <a:rPr lang="pt-PT" dirty="0" err="1"/>
-              <a:t>game’s</a:t>
-            </a:r>
-            <a:r>
-              <a:rPr lang="pt-PT" dirty="0"/>
-              <a:t> rules;</a:t>
-            </a:r>
-          </a:p>
-          <a:p>
-            <a:r>
-              <a:rPr lang="pt-PT" b="1" dirty="0" err="1"/>
-              <a:t>Then</a:t>
-            </a:r>
-            <a:r>
-              <a:rPr lang="pt-PT" dirty="0"/>
-              <a:t>, </a:t>
-            </a:r>
-            <a:r>
-              <a:rPr lang="pt-PT" dirty="0" err="1"/>
-              <a:t>we</a:t>
-            </a:r>
-            <a:r>
-              <a:rPr lang="pt-PT" dirty="0"/>
-              <a:t> </a:t>
-            </a:r>
-            <a:r>
-              <a:rPr lang="pt-PT" dirty="0" err="1"/>
-              <a:t>created</a:t>
-            </a:r>
-            <a:r>
-              <a:rPr lang="pt-PT" dirty="0"/>
-              <a:t> a </a:t>
-            </a:r>
-            <a:r>
-              <a:rPr lang="pt-PT" dirty="0" err="1"/>
-              <a:t>computer</a:t>
-            </a:r>
-            <a:r>
-              <a:rPr lang="pt-PT" dirty="0"/>
-              <a:t> </a:t>
-            </a:r>
-            <a:r>
-              <a:rPr lang="pt-PT" dirty="0" err="1"/>
-              <a:t>mode</a:t>
-            </a:r>
-            <a:r>
-              <a:rPr lang="pt-PT" dirty="0"/>
-              <a:t>, </a:t>
-            </a:r>
-            <a:r>
-              <a:rPr lang="pt-PT" dirty="0" err="1"/>
-              <a:t>that</a:t>
-            </a:r>
-            <a:r>
-              <a:rPr lang="pt-PT" dirty="0"/>
-              <a:t> </a:t>
-            </a:r>
-            <a:r>
-              <a:rPr lang="pt-PT" dirty="0" err="1"/>
-              <a:t>based</a:t>
-            </a:r>
-            <a:r>
-              <a:rPr lang="pt-PT" dirty="0"/>
-              <a:t> </a:t>
-            </a:r>
-            <a:r>
-              <a:rPr lang="pt-PT" dirty="0" err="1"/>
-              <a:t>on</a:t>
-            </a:r>
-            <a:r>
-              <a:rPr lang="pt-PT" dirty="0"/>
-              <a:t> </a:t>
-            </a:r>
-            <a:r>
-              <a:rPr lang="pt-PT" dirty="0" err="1"/>
-              <a:t>chosen</a:t>
-            </a:r>
-            <a:r>
-              <a:rPr lang="pt-PT" dirty="0"/>
-              <a:t> </a:t>
-            </a:r>
-            <a:r>
-              <a:rPr lang="pt-PT" dirty="0" err="1"/>
-              <a:t>level</a:t>
-            </a:r>
-            <a:r>
-              <a:rPr lang="pt-PT" dirty="0"/>
-              <a:t>, </a:t>
-            </a:r>
-            <a:r>
-              <a:rPr lang="pt-PT" dirty="0" err="1"/>
-              <a:t>generates</a:t>
-            </a:r>
-            <a:r>
-              <a:rPr lang="pt-PT" dirty="0"/>
-              <a:t> a </a:t>
-            </a:r>
-            <a:r>
-              <a:rPr lang="pt-PT" dirty="0" err="1"/>
-              <a:t>correct</a:t>
-            </a:r>
-            <a:r>
-              <a:rPr lang="pt-PT" dirty="0"/>
-              <a:t> </a:t>
-            </a:r>
-            <a:r>
-              <a:rPr lang="pt-PT" dirty="0" err="1"/>
-              <a:t>answer</a:t>
-            </a:r>
-            <a:r>
-              <a:rPr lang="pt-PT" dirty="0"/>
-              <a:t>, </a:t>
-            </a:r>
-            <a:r>
-              <a:rPr lang="pt-PT" dirty="0" err="1"/>
-              <a:t>using</a:t>
-            </a:r>
-            <a:r>
-              <a:rPr lang="pt-PT" dirty="0"/>
-              <a:t> </a:t>
-            </a:r>
-            <a:r>
-              <a:rPr lang="pt-PT" dirty="0" err="1"/>
-              <a:t>many</a:t>
-            </a:r>
-            <a:r>
-              <a:rPr lang="pt-PT" dirty="0"/>
-              <a:t> </a:t>
-            </a:r>
-            <a:r>
-              <a:rPr lang="pt-PT" dirty="0" err="1"/>
-              <a:t>algorithms</a:t>
-            </a:r>
-            <a:r>
-              <a:rPr lang="pt-PT" dirty="0"/>
-              <a:t> </a:t>
-            </a:r>
-            <a:r>
-              <a:rPr lang="pt-PT" dirty="0" err="1"/>
-              <a:t>such</a:t>
-            </a:r>
-            <a:r>
-              <a:rPr lang="pt-PT" dirty="0"/>
-              <a:t> as:</a:t>
+              <a:t>Heuristic 3: Manhattan Distance + </a:t>
+            </a:r>
+            <a:r>
+              <a:rPr lang="en-US" dirty="0">
+                <a:solidFill>
+                  <a:srgbClr val="D4D4D4"/>
+                </a:solidFill>
+                <a:effectLst/>
+              </a:rPr>
+              <a:t>Maximum Chess Piece Attacks Difference</a:t>
             </a:r>
           </a:p>
           <a:p>
             <a:pPr lvl="1"/>
             <a:r>
-              <a:rPr lang="pt-PT" dirty="0"/>
-              <a:t>DFS, </a:t>
-            </a:r>
-            <a:r>
-              <a:rPr lang="pt-PT" dirty="0" err="1"/>
-              <a:t>Greedy</a:t>
-            </a:r>
-            <a:r>
-              <a:rPr lang="pt-PT" dirty="0"/>
-              <a:t> </a:t>
-            </a:r>
-            <a:r>
-              <a:rPr lang="pt-PT" dirty="0" err="1"/>
-              <a:t>and</a:t>
-            </a:r>
-            <a:r>
-              <a:rPr lang="pt-PT" dirty="0"/>
-              <a:t> </a:t>
-            </a:r>
-            <a:r>
-              <a:rPr lang="pt-PT" dirty="0" err="1"/>
-              <a:t>A-Star</a:t>
-            </a:r>
-            <a:r>
-              <a:rPr lang="pt-PT" dirty="0"/>
-              <a:t> (</a:t>
-            </a:r>
-            <a:r>
-              <a:rPr lang="pt-PT" dirty="0" err="1"/>
-              <a:t>these</a:t>
-            </a:r>
-            <a:r>
-              <a:rPr lang="pt-PT" dirty="0"/>
-              <a:t> </a:t>
-            </a:r>
-            <a:r>
-              <a:rPr lang="pt-PT" dirty="0" err="1"/>
-              <a:t>last</a:t>
-            </a:r>
-            <a:r>
-              <a:rPr lang="pt-PT" dirty="0"/>
-              <a:t> 2 </a:t>
-            </a:r>
-            <a:r>
-              <a:rPr lang="pt-PT" dirty="0" err="1"/>
-              <a:t>featuring</a:t>
-            </a:r>
-            <a:r>
-              <a:rPr lang="pt-PT" dirty="0"/>
-              <a:t> 3 </a:t>
-            </a:r>
-            <a:r>
-              <a:rPr lang="pt-PT" dirty="0" err="1"/>
-              <a:t>distinct</a:t>
-            </a:r>
-            <a:r>
-              <a:rPr lang="pt-PT" dirty="0"/>
-              <a:t> </a:t>
-            </a:r>
-            <a:r>
-              <a:rPr lang="pt-PT" dirty="0" err="1"/>
-              <a:t>heuristics</a:t>
-            </a:r>
-            <a:r>
-              <a:rPr lang="pt-PT" dirty="0"/>
-              <a:t>) to </a:t>
-            </a:r>
-            <a:r>
-              <a:rPr lang="pt-PT" dirty="0" err="1"/>
-              <a:t>calculate</a:t>
-            </a:r>
-            <a:r>
-              <a:rPr lang="pt-PT" dirty="0"/>
-              <a:t> </a:t>
-            </a:r>
-            <a:r>
-              <a:rPr lang="pt-PT" dirty="0" err="1"/>
-              <a:t>the</a:t>
-            </a:r>
-            <a:r>
-              <a:rPr lang="pt-PT" dirty="0"/>
-              <a:t> </a:t>
-            </a:r>
-            <a:r>
-              <a:rPr lang="pt-PT" dirty="0" err="1"/>
-              <a:t>best</a:t>
-            </a:r>
-            <a:r>
-              <a:rPr lang="pt-PT" dirty="0"/>
-              <a:t> </a:t>
-            </a:r>
-            <a:r>
-              <a:rPr lang="pt-PT" dirty="0" err="1"/>
-              <a:t>path</a:t>
-            </a:r>
-            <a:r>
-              <a:rPr lang="pt-PT" dirty="0"/>
-              <a:t> </a:t>
-            </a:r>
-            <a:r>
-              <a:rPr lang="pt-PT" dirty="0" err="1"/>
-              <a:t>from</a:t>
-            </a:r>
-            <a:r>
-              <a:rPr lang="pt-PT" dirty="0"/>
-              <a:t> </a:t>
-            </a:r>
-            <a:r>
-              <a:rPr lang="pt-PT" dirty="0" err="1"/>
-              <a:t>Start</a:t>
-            </a:r>
-            <a:r>
-              <a:rPr lang="pt-PT" dirty="0"/>
-              <a:t> Tile to Final Tile. </a:t>
-            </a:r>
-            <a:r>
-              <a:rPr lang="pt-PT" dirty="0" err="1"/>
-              <a:t>Each</a:t>
-            </a:r>
-            <a:r>
-              <a:rPr lang="pt-PT" dirty="0"/>
-              <a:t> </a:t>
-            </a:r>
-            <a:r>
-              <a:rPr lang="pt-PT" dirty="0" err="1"/>
-              <a:t>one</a:t>
-            </a:r>
-            <a:r>
-              <a:rPr lang="pt-PT" dirty="0"/>
-              <a:t> </a:t>
-            </a:r>
-            <a:r>
-              <a:rPr lang="pt-PT" dirty="0" err="1"/>
-              <a:t>had</a:t>
-            </a:r>
-            <a:r>
-              <a:rPr lang="pt-PT" dirty="0"/>
-              <a:t> a </a:t>
-            </a:r>
-            <a:r>
-              <a:rPr lang="pt-PT" dirty="0" err="1"/>
-              <a:t>different</a:t>
-            </a:r>
-            <a:r>
-              <a:rPr lang="pt-PT" dirty="0"/>
-              <a:t> performance </a:t>
-            </a:r>
-            <a:r>
-              <a:rPr lang="pt-PT" dirty="0" err="1"/>
-              <a:t>that</a:t>
-            </a:r>
-            <a:r>
-              <a:rPr lang="pt-PT" dirty="0"/>
-              <a:t> </a:t>
-            </a:r>
-            <a:r>
-              <a:rPr lang="pt-PT" dirty="0" err="1"/>
-              <a:t>will</a:t>
-            </a:r>
-            <a:r>
-              <a:rPr lang="pt-PT" dirty="0"/>
-              <a:t> </a:t>
-            </a:r>
-            <a:r>
-              <a:rPr lang="pt-PT" dirty="0" err="1"/>
-              <a:t>be</a:t>
-            </a:r>
-            <a:r>
-              <a:rPr lang="pt-PT" dirty="0"/>
-              <a:t> </a:t>
-            </a:r>
-            <a:r>
-              <a:rPr lang="pt-PT" dirty="0" err="1"/>
-              <a:t>analyzed</a:t>
-            </a:r>
-            <a:r>
-              <a:rPr lang="pt-PT" dirty="0"/>
-              <a:t> later.</a:t>
-            </a:r>
-          </a:p>
-          <a:p>
-            <a:r>
-              <a:rPr lang="pt-PT" dirty="0"/>
-              <a:t> </a:t>
-            </a:r>
-            <a:r>
-              <a:rPr lang="pt-PT" b="1" dirty="0" err="1"/>
-              <a:t>Objective</a:t>
-            </a:r>
-            <a:r>
-              <a:rPr lang="pt-PT" b="1" dirty="0"/>
-              <a:t> </a:t>
-            </a:r>
-            <a:r>
-              <a:rPr lang="pt-PT" b="1" dirty="0" err="1"/>
-              <a:t>Function</a:t>
-            </a:r>
-            <a:r>
-              <a:rPr lang="pt-PT" dirty="0"/>
-              <a:t>: </a:t>
-            </a:r>
-            <a:r>
-              <a:rPr lang="pt-PT" dirty="0" err="1"/>
-              <a:t>The</a:t>
-            </a:r>
-            <a:r>
-              <a:rPr lang="pt-PT" dirty="0"/>
-              <a:t> </a:t>
-            </a:r>
-            <a:r>
-              <a:rPr lang="pt-PT" dirty="0" err="1"/>
-              <a:t>path</a:t>
-            </a:r>
-            <a:r>
-              <a:rPr lang="pt-PT" dirty="0"/>
-              <a:t> </a:t>
-            </a:r>
-            <a:r>
-              <a:rPr lang="pt-PT" dirty="0" err="1"/>
-              <a:t>created</a:t>
-            </a:r>
-            <a:r>
-              <a:rPr lang="pt-PT" dirty="0"/>
-              <a:t> </a:t>
-            </a:r>
-            <a:r>
-              <a:rPr lang="pt-PT" dirty="0" err="1"/>
-              <a:t>from</a:t>
-            </a:r>
-            <a:r>
-              <a:rPr lang="pt-PT" dirty="0"/>
-              <a:t> star to </a:t>
-            </a:r>
-            <a:r>
-              <a:rPr lang="pt-PT" dirty="0" err="1"/>
-              <a:t>end</a:t>
-            </a:r>
-            <a:r>
-              <a:rPr lang="pt-PT" dirty="0"/>
-              <a:t> file </a:t>
-            </a:r>
-            <a:r>
-              <a:rPr lang="pt-PT" dirty="0" err="1"/>
-              <a:t>should</a:t>
-            </a:r>
-            <a:r>
-              <a:rPr lang="pt-PT" dirty="0"/>
-              <a:t> </a:t>
-            </a:r>
-            <a:r>
-              <a:rPr lang="pt-PT" dirty="0" err="1"/>
-              <a:t>be</a:t>
-            </a:r>
-            <a:r>
-              <a:rPr lang="pt-PT" dirty="0"/>
-              <a:t> as </a:t>
-            </a:r>
-            <a:r>
-              <a:rPr lang="pt-PT" dirty="0" err="1"/>
-              <a:t>shorter</a:t>
-            </a:r>
-            <a:r>
-              <a:rPr lang="pt-PT" dirty="0"/>
-              <a:t> as </a:t>
-            </a:r>
-            <a:r>
-              <a:rPr lang="pt-PT" dirty="0" err="1"/>
-              <a:t>possible</a:t>
-            </a:r>
-            <a:r>
-              <a:rPr lang="pt-PT" dirty="0"/>
-              <a:t>, </a:t>
-            </a:r>
-            <a:r>
-              <a:rPr lang="pt-PT" dirty="0" err="1"/>
-              <a:t>respecting</a:t>
-            </a:r>
-            <a:r>
-              <a:rPr lang="pt-PT" dirty="0"/>
-              <a:t> </a:t>
-            </a:r>
-            <a:r>
-              <a:rPr lang="pt-PT" dirty="0" err="1"/>
-              <a:t>all</a:t>
-            </a:r>
-            <a:r>
-              <a:rPr lang="pt-PT" dirty="0"/>
-              <a:t> game rules </a:t>
-            </a:r>
-            <a:r>
-              <a:rPr lang="pt-PT" dirty="0" err="1"/>
-              <a:t>and</a:t>
-            </a:r>
-            <a:r>
-              <a:rPr lang="pt-PT" dirty="0"/>
-              <a:t> </a:t>
-            </a:r>
-            <a:r>
-              <a:rPr lang="pt-PT" dirty="0" err="1"/>
-              <a:t>matching</a:t>
-            </a:r>
-            <a:r>
-              <a:rPr lang="pt-PT" dirty="0"/>
-              <a:t> </a:t>
-            </a:r>
-            <a:r>
-              <a:rPr lang="pt-PT" dirty="0" err="1"/>
-              <a:t>an</a:t>
-            </a:r>
-            <a:r>
-              <a:rPr lang="pt-PT" dirty="0"/>
-              <a:t> </a:t>
-            </a:r>
-            <a:r>
-              <a:rPr lang="pt-PT" dirty="0" err="1"/>
-              <a:t>equal</a:t>
-            </a:r>
-            <a:r>
-              <a:rPr lang="pt-PT" dirty="0"/>
-              <a:t> </a:t>
-            </a:r>
-            <a:r>
-              <a:rPr lang="pt-PT" dirty="0" err="1"/>
-              <a:t>number</a:t>
-            </a:r>
-            <a:r>
-              <a:rPr lang="pt-PT" dirty="0"/>
-              <a:t> </a:t>
-            </a:r>
-            <a:r>
-              <a:rPr lang="pt-PT" dirty="0" err="1"/>
-              <a:t>of</a:t>
-            </a:r>
-            <a:r>
-              <a:rPr lang="pt-PT" dirty="0"/>
-              <a:t> tiles </a:t>
-            </a:r>
-            <a:r>
-              <a:rPr lang="pt-PT" dirty="0" err="1"/>
-              <a:t>attacked</a:t>
-            </a:r>
-            <a:r>
-              <a:rPr lang="pt-PT" dirty="0"/>
-              <a:t> </a:t>
-            </a:r>
-            <a:r>
-              <a:rPr lang="pt-PT" dirty="0" err="1"/>
-              <a:t>by</a:t>
-            </a:r>
-            <a:r>
-              <a:rPr lang="pt-PT" dirty="0"/>
-              <a:t> </a:t>
-            </a:r>
-            <a:r>
-              <a:rPr lang="pt-PT" dirty="0" err="1"/>
-              <a:t>chess</a:t>
-            </a:r>
-            <a:r>
-              <a:rPr lang="pt-PT" dirty="0"/>
-              <a:t> </a:t>
-            </a:r>
-            <a:r>
-              <a:rPr lang="pt-PT" dirty="0" err="1"/>
-              <a:t>pieces</a:t>
-            </a:r>
-            <a:r>
-              <a:rPr lang="pt-PT" dirty="0"/>
-              <a:t>;</a:t>
-            </a:r>
-          </a:p>
-          <a:p>
-            <a:r>
-              <a:rPr lang="pt-PT" b="1" dirty="0" err="1"/>
-              <a:t>Heuristics</a:t>
-            </a:r>
-            <a:r>
-              <a:rPr lang="pt-PT" dirty="0"/>
-              <a:t>: For </a:t>
-            </a:r>
-            <a:r>
-              <a:rPr lang="pt-PT" dirty="0" err="1"/>
-              <a:t>our</a:t>
-            </a:r>
-            <a:r>
-              <a:rPr lang="pt-PT" dirty="0"/>
-              <a:t> </a:t>
-            </a:r>
-            <a:r>
-              <a:rPr lang="pt-PT" dirty="0" err="1"/>
-              <a:t>second</a:t>
-            </a:r>
-            <a:r>
-              <a:rPr lang="pt-PT" dirty="0"/>
-              <a:t> </a:t>
-            </a:r>
-            <a:r>
-              <a:rPr lang="pt-PT" dirty="0" err="1"/>
-              <a:t>part</a:t>
-            </a:r>
-            <a:r>
-              <a:rPr lang="pt-PT" dirty="0"/>
-              <a:t> </a:t>
-            </a:r>
-            <a:r>
-              <a:rPr lang="pt-PT" dirty="0" err="1"/>
-              <a:t>of</a:t>
-            </a:r>
-            <a:r>
-              <a:rPr lang="pt-PT" dirty="0"/>
-              <a:t> </a:t>
-            </a:r>
-            <a:r>
-              <a:rPr lang="pt-PT" dirty="0" err="1"/>
-              <a:t>the</a:t>
-            </a:r>
-            <a:r>
-              <a:rPr lang="pt-PT" dirty="0"/>
-              <a:t> Project, </a:t>
-            </a:r>
-            <a:r>
-              <a:rPr lang="pt-PT" dirty="0" err="1"/>
-              <a:t>heuristics</a:t>
-            </a:r>
-            <a:r>
-              <a:rPr lang="pt-PT" dirty="0"/>
-              <a:t> </a:t>
-            </a:r>
-            <a:r>
-              <a:rPr lang="pt-PT" dirty="0" err="1"/>
-              <a:t>were</a:t>
-            </a:r>
-            <a:r>
-              <a:rPr lang="pt-PT" dirty="0"/>
-              <a:t> </a:t>
-            </a:r>
-            <a:r>
-              <a:rPr lang="pt-PT" dirty="0" err="1"/>
-              <a:t>important</a:t>
-            </a:r>
-            <a:r>
-              <a:rPr lang="pt-PT" dirty="0"/>
-              <a:t> for </a:t>
-            </a:r>
-            <a:r>
-              <a:rPr lang="pt-PT" dirty="0" err="1"/>
-              <a:t>implementing</a:t>
-            </a:r>
-            <a:r>
-              <a:rPr lang="pt-PT" dirty="0"/>
-              <a:t> </a:t>
-            </a:r>
-            <a:r>
-              <a:rPr lang="pt-PT" dirty="0" err="1"/>
-              <a:t>A-star</a:t>
-            </a:r>
-            <a:r>
-              <a:rPr lang="pt-PT" dirty="0"/>
-              <a:t> </a:t>
-            </a:r>
-            <a:r>
-              <a:rPr lang="pt-PT" dirty="0" err="1"/>
-              <a:t>Algorithms</a:t>
-            </a:r>
-            <a:r>
-              <a:rPr lang="pt-PT" dirty="0"/>
-              <a:t> </a:t>
-            </a:r>
-            <a:r>
-              <a:rPr lang="pt-PT" dirty="0" err="1"/>
-              <a:t>and</a:t>
-            </a:r>
-            <a:r>
-              <a:rPr lang="pt-PT" dirty="0"/>
-              <a:t> to </a:t>
-            </a:r>
-            <a:r>
-              <a:rPr lang="pt-PT" dirty="0" err="1"/>
-              <a:t>generate</a:t>
-            </a:r>
-            <a:r>
-              <a:rPr lang="pt-PT" dirty="0"/>
-              <a:t> </a:t>
-            </a:r>
-            <a:r>
-              <a:rPr lang="pt-PT" dirty="0" err="1"/>
-              <a:t>quickly</a:t>
-            </a:r>
-            <a:r>
-              <a:rPr lang="pt-PT" dirty="0"/>
-              <a:t> </a:t>
-            </a:r>
-            <a:r>
-              <a:rPr lang="pt-PT" dirty="0" err="1"/>
-              <a:t>better</a:t>
-            </a:r>
-            <a:r>
-              <a:rPr lang="pt-PT" dirty="0"/>
-              <a:t> </a:t>
-            </a:r>
-            <a:r>
-              <a:rPr lang="pt-PT" dirty="0" err="1"/>
-              <a:t>solutions</a:t>
-            </a:r>
-            <a:r>
-              <a:rPr lang="pt-PT" dirty="0"/>
-              <a:t>:</a:t>
-            </a:r>
-          </a:p>
-          <a:p>
-            <a:pPr lvl="1"/>
-            <a:r>
-              <a:rPr lang="pt-PT" dirty="0" err="1"/>
-              <a:t>Heuristic</a:t>
-            </a:r>
-            <a:r>
-              <a:rPr lang="pt-PT" dirty="0"/>
-              <a:t> 1: Manhattan </a:t>
-            </a:r>
-            <a:r>
-              <a:rPr lang="pt-PT" dirty="0" err="1"/>
-              <a:t>Distance</a:t>
-            </a:r>
-            <a:r>
-              <a:rPr lang="pt-PT" dirty="0"/>
-              <a:t> + Game </a:t>
-            </a:r>
-            <a:r>
-              <a:rPr lang="pt-PT" dirty="0" err="1"/>
-              <a:t>Cost</a:t>
-            </a:r>
-            <a:r>
-              <a:rPr lang="pt-PT" dirty="0"/>
-              <a:t> (</a:t>
-            </a:r>
-            <a:r>
-              <a:rPr lang="pt-PT" dirty="0" err="1"/>
-              <a:t>path’s</a:t>
-            </a:r>
-            <a:r>
-              <a:rPr lang="pt-PT" dirty="0"/>
-              <a:t> </a:t>
-            </a:r>
-            <a:r>
-              <a:rPr lang="pt-PT" dirty="0" err="1"/>
-              <a:t>size</a:t>
-            </a:r>
-            <a:r>
-              <a:rPr lang="pt-PT" dirty="0"/>
-              <a:t>);</a:t>
-            </a:r>
-          </a:p>
-          <a:p>
-            <a:pPr lvl="1"/>
-            <a:r>
-              <a:rPr lang="pt-PT" dirty="0" err="1"/>
-              <a:t>Heuristic</a:t>
-            </a:r>
-            <a:r>
-              <a:rPr lang="pt-PT" dirty="0"/>
-              <a:t> 2: </a:t>
-            </a:r>
-            <a:r>
-              <a:rPr lang="pt-PT" dirty="0" err="1"/>
-              <a:t>Attacked</a:t>
-            </a:r>
-            <a:r>
-              <a:rPr lang="pt-PT" dirty="0"/>
-              <a:t> Tiles + Game </a:t>
-            </a:r>
-            <a:r>
-              <a:rPr lang="pt-PT" dirty="0" err="1"/>
-              <a:t>Cost</a:t>
-            </a:r>
-            <a:r>
-              <a:rPr lang="pt-PT" dirty="0"/>
-              <a:t> (</a:t>
-            </a:r>
-            <a:r>
-              <a:rPr lang="pt-PT" dirty="0" err="1"/>
-              <a:t>path’s</a:t>
-            </a:r>
-            <a:r>
-              <a:rPr lang="pt-PT" dirty="0"/>
-              <a:t> </a:t>
-            </a:r>
-            <a:r>
-              <a:rPr lang="pt-PT" dirty="0" err="1"/>
-              <a:t>size</a:t>
-            </a:r>
-            <a:r>
-              <a:rPr lang="pt-PT" dirty="0"/>
-              <a:t>);</a:t>
-            </a:r>
-          </a:p>
-          <a:p>
-            <a:pPr lvl="1"/>
-            <a:r>
-              <a:rPr lang="pt-PT" dirty="0" err="1"/>
-              <a:t>Heuristic</a:t>
-            </a:r>
-            <a:r>
-              <a:rPr lang="pt-PT" dirty="0"/>
-              <a:t> 3: Manhattan </a:t>
-            </a:r>
-            <a:r>
-              <a:rPr lang="pt-PT" dirty="0" err="1"/>
-              <a:t>Distance</a:t>
-            </a:r>
-            <a:r>
-              <a:rPr lang="pt-PT" dirty="0"/>
-              <a:t> + </a:t>
-            </a:r>
-            <a:r>
-              <a:rPr lang="pt-PT" dirty="0" err="1"/>
-              <a:t>Attacked</a:t>
-            </a:r>
-            <a:r>
-              <a:rPr lang="pt-PT" dirty="0"/>
-              <a:t> Tiles + Game </a:t>
-            </a:r>
-            <a:r>
-              <a:rPr lang="pt-PT" dirty="0" err="1"/>
-              <a:t>Cost</a:t>
-            </a:r>
-            <a:r>
-              <a:rPr lang="pt-PT" dirty="0"/>
-              <a:t> (</a:t>
-            </a:r>
-            <a:r>
-              <a:rPr lang="pt-PT" dirty="0" err="1"/>
-              <a:t>path’s</a:t>
-            </a:r>
-            <a:r>
-              <a:rPr lang="pt-PT" dirty="0"/>
-              <a:t> </a:t>
-            </a:r>
-            <a:r>
-              <a:rPr lang="pt-PT" dirty="0" err="1"/>
-              <a:t>size</a:t>
-            </a:r>
-            <a:r>
-              <a:rPr lang="pt-PT" dirty="0"/>
-              <a:t>);</a:t>
-            </a:r>
+              <a:rPr lang="en-US" dirty="0">
+                <a:solidFill>
+                  <a:srgbClr val="D4D4D4"/>
+                </a:solidFill>
+              </a:rPr>
+              <a:t>Note: For the A-Star algorithm we used the function f ( f (n) = g(n) + h(n)) where g is the total cost (path distance) and h was the chosen heuristic.</a:t>
+            </a:r>
+            <a:endParaRPr lang="pt-PT" dirty="0"/>
           </a:p>
         </p:txBody>
       </p:sp>
@@ -10818,7 +9375,7 @@
           <p:nvPr>
             <p:extLst>
               <p:ext uri="{D42A27DB-BD31-4B8C-83A1-F6EECF244321}">
-                <p14:modId xmlns:p14="http://schemas.microsoft.com/office/powerpoint/2010/main" val="3833297221"/>
+                <p14:modId xmlns:p14="http://schemas.microsoft.com/office/powerpoint/2010/main" val="1025462951"/>
               </p:ext>
             </p:extLst>
           </p:nvPr>
@@ -10848,7 +9405,7 @@
           <p:nvPr>
             <p:extLst>
               <p:ext uri="{D42A27DB-BD31-4B8C-83A1-F6EECF244321}">
-                <p14:modId xmlns:p14="http://schemas.microsoft.com/office/powerpoint/2010/main" val="2626010437"/>
+                <p14:modId xmlns:p14="http://schemas.microsoft.com/office/powerpoint/2010/main" val="1290710945"/>
               </p:ext>
             </p:extLst>
           </p:nvPr>

</xml_diff>

<commit_message>
Fix ppt error in graph
</commit_message>
<xml_diff>
--- a/Chess Snake Puzzles – 2022 IA Project - Final Delivery.pptx
+++ b/Chess Snake Puzzles – 2022 IA Project - Final Delivery.pptx
@@ -144,7 +144,7 @@
   <pc:docChgLst>
     <pc:chgData name="Carlos Gomes" userId="befe0c0c48f41b83" providerId="LiveId" clId="{1FAC947E-5D31-4632-AFA2-6C66DC948B4A}"/>
     <pc:docChg chg="undo custSel modSld">
-      <pc:chgData name="Carlos Gomes" userId="befe0c0c48f41b83" providerId="LiveId" clId="{1FAC947E-5D31-4632-AFA2-6C66DC948B4A}" dt="2022-04-25T15:52:01.587" v="1366" actId="20577"/>
+      <pc:chgData name="Carlos Gomes" userId="befe0c0c48f41b83" providerId="LiveId" clId="{1FAC947E-5D31-4632-AFA2-6C66DC948B4A}" dt="2022-04-25T17:01:53.875" v="1371" actId="27918"/>
       <pc:docMkLst>
         <pc:docMk/>
       </pc:docMkLst>
@@ -248,7 +248,7 @@
         </pc:spChg>
       </pc:sldChg>
       <pc:sldChg chg="modSp mod">
-        <pc:chgData name="Carlos Gomes" userId="befe0c0c48f41b83" providerId="LiveId" clId="{1FAC947E-5D31-4632-AFA2-6C66DC948B4A}" dt="2022-04-25T15:13:07.944" v="22" actId="692"/>
+        <pc:chgData name="Carlos Gomes" userId="befe0c0c48f41b83" providerId="LiveId" clId="{1FAC947E-5D31-4632-AFA2-6C66DC948B4A}" dt="2022-04-25T17:01:53.875" v="1371" actId="27918"/>
         <pc:sldMkLst>
           <pc:docMk/>
           <pc:sldMk cId="1535208297" sldId="264"/>
@@ -366,7 +366,7 @@
                   <c:v>4.8600000000000003</c:v>
                 </c:pt>
                 <c:pt idx="4">
-                  <c:v>0</c:v>
+                  <c:v>3.24425077438354</c:v>
                 </c:pt>
                 <c:pt idx="5">
                   <c:v>0.12</c:v>
@@ -621,7 +621,7 @@
                   <c:v>5.6847333999999999E-2</c:v>
                 </c:pt>
                 <c:pt idx="3">
-                  <c:v>0</c:v>
+                  <c:v>4.6560790538787797</c:v>
                 </c:pt>
                 <c:pt idx="4">
                   <c:v>2.1158781050000002</c:v>
@@ -870,7 +870,7 @@
                 <c:formatCode>General</c:formatCode>
                 <c:ptCount val="6"/>
                 <c:pt idx="0">
-                  <c:v>0</c:v>
+                  <c:v>2.5981664657592701E-2</c:v>
                 </c:pt>
                 <c:pt idx="1">
                   <c:v>2.7534962E-2</c:v>
@@ -9375,7 +9375,7 @@
           <p:nvPr>
             <p:extLst>
               <p:ext uri="{D42A27DB-BD31-4B8C-83A1-F6EECF244321}">
-                <p14:modId xmlns:p14="http://schemas.microsoft.com/office/powerpoint/2010/main" val="1025462951"/>
+                <p14:modId xmlns:p14="http://schemas.microsoft.com/office/powerpoint/2010/main" val="3564716119"/>
               </p:ext>
             </p:extLst>
           </p:nvPr>

</xml_diff>